<commit_message>
Update Begin Latex in minute.pptx
</commit_message>
<xml_diff>
--- a/chapter 07 - Latex Programming/Begin Latex in minute.pptx
+++ b/chapter 07 - Latex Programming/Begin Latex in minute.pptx
@@ -5,7 +5,7 @@
     <p:sldMasterId id="2147483648" r:id="rId1"/>
   </p:sldMasterIdLst>
   <p:notesMasterIdLst>
-    <p:notesMasterId r:id="rId38"/>
+    <p:notesMasterId r:id="rId53"/>
   </p:notesMasterIdLst>
   <p:sldIdLst>
     <p:sldId id="256" r:id="rId2"/>
@@ -34,38 +34,53 @@
     <p:sldId id="275" r:id="rId25"/>
     <p:sldId id="276" r:id="rId26"/>
     <p:sldId id="282" r:id="rId27"/>
-    <p:sldId id="285" r:id="rId28"/>
-    <p:sldId id="286" r:id="rId29"/>
-    <p:sldId id="287" r:id="rId30"/>
-    <p:sldId id="288" r:id="rId31"/>
-    <p:sldId id="289" r:id="rId32"/>
-    <p:sldId id="290" r:id="rId33"/>
-    <p:sldId id="291" r:id="rId34"/>
-    <p:sldId id="277" r:id="rId35"/>
-    <p:sldId id="278" r:id="rId36"/>
-    <p:sldId id="281" r:id="rId37"/>
+    <p:sldId id="292" r:id="rId28"/>
+    <p:sldId id="293" r:id="rId29"/>
+    <p:sldId id="294" r:id="rId30"/>
+    <p:sldId id="295" r:id="rId31"/>
+    <p:sldId id="296" r:id="rId32"/>
+    <p:sldId id="297" r:id="rId33"/>
+    <p:sldId id="298" r:id="rId34"/>
+    <p:sldId id="299" r:id="rId35"/>
+    <p:sldId id="300" r:id="rId36"/>
+    <p:sldId id="301" r:id="rId37"/>
+    <p:sldId id="302" r:id="rId38"/>
+    <p:sldId id="285" r:id="rId39"/>
+    <p:sldId id="286" r:id="rId40"/>
+    <p:sldId id="303" r:id="rId41"/>
+    <p:sldId id="287" r:id="rId42"/>
+    <p:sldId id="288" r:id="rId43"/>
+    <p:sldId id="289" r:id="rId44"/>
+    <p:sldId id="290" r:id="rId45"/>
+    <p:sldId id="291" r:id="rId46"/>
+    <p:sldId id="304" r:id="rId47"/>
+    <p:sldId id="305" r:id="rId48"/>
+    <p:sldId id="306" r:id="rId49"/>
+    <p:sldId id="277" r:id="rId50"/>
+    <p:sldId id="278" r:id="rId51"/>
+    <p:sldId id="281" r:id="rId52"/>
   </p:sldIdLst>
   <p:sldSz cx="9144000" cy="6858000" type="screen4x3"/>
   <p:notesSz cx="6858000" cy="9144000"/>
   <p:embeddedFontLst>
     <p:embeddedFont>
-      <p:font typeface="Arial Unicode MS" panose="020B0604020202020204" pitchFamily="34" charset="-122"/>
-      <p:regular r:id="rId39"/>
-    </p:embeddedFont>
-    <p:embeddedFont>
       <p:font typeface="Calibri" panose="020F0502020204030204" pitchFamily="34" charset="0"/>
-      <p:regular r:id="rId40"/>
-      <p:bold r:id="rId41"/>
-      <p:italic r:id="rId42"/>
-      <p:boldItalic r:id="rId43"/>
-    </p:embeddedFont>
-    <p:embeddedFont>
-      <p:font typeface="Open Sans Light" panose="020B0604020202020204" charset="0"/>
-      <p:regular r:id="rId44"/>
+      <p:regular r:id="rId54"/>
+      <p:bold r:id="rId55"/>
+      <p:italic r:id="rId56"/>
+      <p:boldItalic r:id="rId57"/>
     </p:embeddedFont>
     <p:embeddedFont>
       <p:font typeface="腾祥嘉丽线黑简" panose="02010600030101010101" charset="-122"/>
-      <p:regular r:id="rId45"/>
+      <p:regular r:id="rId58"/>
+    </p:embeddedFont>
+    <p:embeddedFont>
+      <p:font typeface="Arial Unicode MS" panose="020B0604020202020204" pitchFamily="34" charset="-122"/>
+      <p:regular r:id="rId59"/>
+    </p:embeddedFont>
+    <p:embeddedFont>
+      <p:font typeface="Open Sans Light" panose="02010600030101010101" charset="0"/>
+      <p:regular r:id="rId60"/>
     </p:embeddedFont>
   </p:embeddedFontLst>
   <p:defaultTextStyle>
@@ -264,7 +279,7 @@
           <a:p>
             <a:fld id="{E91DDA70-9ABB-48BD-AFA1-521354C93EB2}" type="datetimeFigureOut">
               <a:rPr lang="zh-CN" altLang="en-US" smtClean="0"/>
-              <a:t>2018/4/25</a:t>
+              <a:t>2019/4/6</a:t>
             </a:fld>
             <a:endParaRPr lang="zh-CN" altLang="en-US"/>
           </a:p>
@@ -616,6 +631,90 @@
 </p:notes>
 </file>
 
+<file path=ppt/notesSlides/notesSlide2.xml><?xml version="1.0" encoding="utf-8"?>
+<p:notes xmlns:a="http://schemas.openxmlformats.org/drawingml/2006/main" xmlns:r="http://schemas.openxmlformats.org/officeDocument/2006/relationships" xmlns:p="http://schemas.openxmlformats.org/presentationml/2006/main">
+  <p:cSld>
+    <p:spTree>
+      <p:nvGrpSpPr>
+        <p:cNvPr id="1" name=""/>
+        <p:cNvGrpSpPr/>
+        <p:nvPr/>
+      </p:nvGrpSpPr>
+      <p:grpSpPr>
+        <a:xfrm>
+          <a:off x="0" y="0"/>
+          <a:ext cx="0" cy="0"/>
+          <a:chOff x="0" y="0"/>
+          <a:chExt cx="0" cy="0"/>
+        </a:xfrm>
+      </p:grpSpPr>
+      <p:sp>
+        <p:nvSpPr>
+          <p:cNvPr id="2" name="幻灯片图像占位符 1"/>
+          <p:cNvSpPr>
+            <a:spLocks noGrp="1" noRot="1" noChangeAspect="1"/>
+          </p:cNvSpPr>
+          <p:nvPr>
+            <p:ph type="sldImg"/>
+          </p:nvPr>
+        </p:nvSpPr>
+        <p:spPr/>
+      </p:sp>
+      <p:sp>
+        <p:nvSpPr>
+          <p:cNvPr id="3" name="备注占位符 2"/>
+          <p:cNvSpPr>
+            <a:spLocks noGrp="1"/>
+          </p:cNvSpPr>
+          <p:nvPr>
+            <p:ph type="body" idx="1"/>
+          </p:nvPr>
+        </p:nvSpPr>
+        <p:spPr/>
+        <p:txBody>
+          <a:bodyPr/>
+          <a:lstStyle/>
+          <a:p>
+            <a:endParaRPr lang="zh-CN" altLang="en-US" dirty="0"/>
+          </a:p>
+        </p:txBody>
+      </p:sp>
+      <p:sp>
+        <p:nvSpPr>
+          <p:cNvPr id="4" name="灯片编号占位符 3"/>
+          <p:cNvSpPr>
+            <a:spLocks noGrp="1"/>
+          </p:cNvSpPr>
+          <p:nvPr>
+            <p:ph type="sldNum" sz="quarter" idx="10"/>
+          </p:nvPr>
+        </p:nvSpPr>
+        <p:spPr/>
+        <p:txBody>
+          <a:bodyPr/>
+          <a:lstStyle/>
+          <a:p>
+            <a:fld id="{5659187A-BB23-4800-A30B-D28C6B20B065}" type="slidenum">
+              <a:rPr lang="zh-CN" altLang="en-US" smtClean="0"/>
+              <a:t>29</a:t>
+            </a:fld>
+            <a:endParaRPr lang="zh-CN" altLang="en-US"/>
+          </a:p>
+        </p:txBody>
+      </p:sp>
+    </p:spTree>
+    <p:extLst>
+      <p:ext uri="{BB962C8B-B14F-4D97-AF65-F5344CB8AC3E}">
+        <p14:creationId xmlns:p14="http://schemas.microsoft.com/office/powerpoint/2010/main" val="919226822"/>
+      </p:ext>
+    </p:extLst>
+  </p:cSld>
+  <p:clrMapOvr>
+    <a:masterClrMapping/>
+  </p:clrMapOvr>
+</p:notes>
+</file>
+
 <file path=ppt/slideLayouts/slideLayout1.xml><?xml version="1.0" encoding="utf-8"?>
 <p:sldLayout xmlns:a="http://schemas.openxmlformats.org/drawingml/2006/main" xmlns:r="http://schemas.openxmlformats.org/officeDocument/2006/relationships" xmlns:p="http://schemas.openxmlformats.org/presentationml/2006/main" type="title" preserve="1">
   <p:cSld name="标题幻灯片">
@@ -814,7 +913,7 @@
           <a:p>
             <a:fld id="{BF353E24-75C5-4466-B8AD-0A8FC8EA8740}" type="datetimeFigureOut">
               <a:rPr lang="zh-CN" altLang="en-US" smtClean="0"/>
-              <a:t>2018/4/25</a:t>
+              <a:t>2019/4/6</a:t>
             </a:fld>
             <a:endParaRPr lang="zh-CN" altLang="en-US"/>
           </a:p>
@@ -1622,7 +1721,7 @@
           <a:p>
             <a:fld id="{BF353E24-75C5-4466-B8AD-0A8FC8EA8740}" type="datetimeFigureOut">
               <a:rPr lang="zh-CN" altLang="en-US" smtClean="0"/>
-              <a:t>2018/4/25</a:t>
+              <a:t>2019/4/6</a:t>
             </a:fld>
             <a:endParaRPr lang="zh-CN" altLang="en-US"/>
           </a:p>
@@ -1993,7 +2092,7 @@
             <a:fld id="{BF353E24-75C5-4466-B8AD-0A8FC8EA8740}" type="datetimeFigureOut">
               <a:rPr lang="zh-CN" altLang="en-US" smtClean="0"/>
               <a:pPr/>
-              <a:t>2018/4/25</a:t>
+              <a:t>2019/4/6</a:t>
             </a:fld>
             <a:endParaRPr lang="zh-CN" altLang="en-US" dirty="0"/>
           </a:p>
@@ -2590,7 +2689,7 @@
           <a:p>
             <a:fld id="{BF353E24-75C5-4466-B8AD-0A8FC8EA8740}" type="datetimeFigureOut">
               <a:rPr lang="zh-CN" altLang="en-US" smtClean="0"/>
-              <a:t>2018/4/25</a:t>
+              <a:t>2019/4/6</a:t>
             </a:fld>
             <a:endParaRPr lang="zh-CN" altLang="en-US"/>
           </a:p>
@@ -3020,7 +3119,7 @@
           <a:p>
             <a:fld id="{BF353E24-75C5-4466-B8AD-0A8FC8EA8740}" type="datetimeFigureOut">
               <a:rPr lang="zh-CN" altLang="en-US" smtClean="0"/>
-              <a:t>2018/4/25</a:t>
+              <a:t>2019/4/6</a:t>
             </a:fld>
             <a:endParaRPr lang="zh-CN" altLang="en-US"/>
           </a:p>
@@ -3919,7 +4018,7 @@
           <a:p>
             <a:fld id="{BF353E24-75C5-4466-B8AD-0A8FC8EA8740}" type="datetimeFigureOut">
               <a:rPr lang="zh-CN" altLang="en-US" smtClean="0"/>
-              <a:t>2018/4/25</a:t>
+              <a:t>2019/4/6</a:t>
             </a:fld>
             <a:endParaRPr lang="zh-CN" altLang="en-US"/>
           </a:p>
@@ -4305,7 +4404,7 @@
           <a:p>
             <a:fld id="{BF353E24-75C5-4466-B8AD-0A8FC8EA8740}" type="datetimeFigureOut">
               <a:rPr lang="zh-CN" altLang="en-US" smtClean="0"/>
-              <a:t>2018/4/25</a:t>
+              <a:t>2019/4/6</a:t>
             </a:fld>
             <a:endParaRPr lang="zh-CN" altLang="en-US"/>
           </a:p>
@@ -4520,7 +4619,7 @@
           <a:p>
             <a:fld id="{BF353E24-75C5-4466-B8AD-0A8FC8EA8740}" type="datetimeFigureOut">
               <a:rPr lang="zh-CN" altLang="en-US" smtClean="0"/>
-              <a:t>2018/4/25</a:t>
+              <a:t>2019/4/6</a:t>
             </a:fld>
             <a:endParaRPr lang="zh-CN" altLang="en-US"/>
           </a:p>
@@ -4754,7 +4853,7 @@
             <a:fld id="{BF353E24-75C5-4466-B8AD-0A8FC8EA8740}" type="datetimeFigureOut">
               <a:rPr lang="zh-CN" altLang="en-US" smtClean="0"/>
               <a:pPr/>
-              <a:t>2018/4/25</a:t>
+              <a:t>2019/4/6</a:t>
             </a:fld>
             <a:endParaRPr lang="zh-CN" altLang="en-US"/>
           </a:p>
@@ -9904,11 +10003,7 @@
             </a:pPr>
             <a:r>
               <a:rPr lang="en-US" altLang="zh-CN" dirty="0" smtClean="0"/>
-              <a:t>Use Visio to generate a </a:t>
-            </a:r>
-            <a:r>
-              <a:rPr lang="en-US" altLang="zh-CN" dirty="0" smtClean="0"/>
-              <a:t>paradigm figure</a:t>
+              <a:t>Use Visio to generate a paradigm figure</a:t>
             </a:r>
           </a:p>
           <a:p>
@@ -10275,11 +10370,7 @@
             </a:pPr>
             <a:r>
               <a:rPr lang="en-US" altLang="zh-CN" dirty="0"/>
-              <a:t>‼️</a:t>
-            </a:r>
-            <a:r>
-              <a:rPr lang="en-US" altLang="zh-CN" dirty="0"/>
-              <a:t> </a:t>
+              <a:t>‼️ </a:t>
             </a:r>
             <a:r>
               <a:rPr lang="en-US" altLang="zh-CN" b="1" dirty="0"/>
@@ -10537,6 +10628,2384 @@
 </file>
 
 <file path=ppt/slides/slide27.xml><?xml version="1.0" encoding="utf-8"?>
+<p:sld xmlns:a="http://schemas.openxmlformats.org/drawingml/2006/main" xmlns:r="http://schemas.openxmlformats.org/officeDocument/2006/relationships" xmlns:p="http://schemas.openxmlformats.org/presentationml/2006/main">
+  <p:cSld>
+    <p:spTree>
+      <p:nvGrpSpPr>
+        <p:cNvPr id="1" name=""/>
+        <p:cNvGrpSpPr/>
+        <p:nvPr/>
+      </p:nvGrpSpPr>
+      <p:grpSpPr>
+        <a:xfrm>
+          <a:off x="0" y="0"/>
+          <a:ext cx="0" cy="0"/>
+          <a:chOff x="0" y="0"/>
+          <a:chExt cx="0" cy="0"/>
+        </a:xfrm>
+      </p:grpSpPr>
+      <p:sp>
+        <p:nvSpPr>
+          <p:cNvPr id="2" name="内容占位符 1"/>
+          <p:cNvSpPr>
+            <a:spLocks noGrp="1"/>
+          </p:cNvSpPr>
+          <p:nvPr>
+            <p:ph sz="half" idx="2"/>
+          </p:nvPr>
+        </p:nvSpPr>
+        <p:spPr/>
+        <p:txBody>
+          <a:bodyPr/>
+          <a:lstStyle/>
+          <a:p>
+            <a:pPr marL="342900" indent="-342900">
+              <a:buFont typeface="Wingdings" panose="05000000000000000000" pitchFamily="2" charset="2"/>
+              <a:buChar char="l"/>
+            </a:pPr>
+            <a:r>
+              <a:rPr lang="en-US" altLang="zh-CN" dirty="0" smtClean="0"/>
+              <a:t>Use Matplotlib </a:t>
+            </a:r>
+            <a:r>
+              <a:rPr lang="en-US" altLang="zh-CN" dirty="0"/>
+              <a:t>to Plot </a:t>
+            </a:r>
+            <a:r>
+              <a:rPr lang="en-US" altLang="zh-CN" dirty="0" smtClean="0"/>
+              <a:t>Data</a:t>
+            </a:r>
+          </a:p>
+          <a:p>
+            <a:pPr marL="342900" indent="-342900">
+              <a:buFont typeface="Wingdings" panose="05000000000000000000" pitchFamily="2" charset="2"/>
+              <a:buChar char="l"/>
+            </a:pPr>
+            <a:r>
+              <a:rPr lang="en-US" altLang="zh-CN" dirty="0" smtClean="0"/>
+              <a:t>Line</a:t>
+            </a:r>
+          </a:p>
+        </p:txBody>
+      </p:sp>
+      <p:sp>
+        <p:nvSpPr>
+          <p:cNvPr id="3" name="标题 2"/>
+          <p:cNvSpPr>
+            <a:spLocks noGrp="1"/>
+          </p:cNvSpPr>
+          <p:nvPr>
+            <p:ph type="title"/>
+          </p:nvPr>
+        </p:nvSpPr>
+        <p:spPr/>
+        <p:txBody>
+          <a:bodyPr/>
+          <a:lstStyle/>
+          <a:p>
+            <a:r>
+              <a:rPr lang="en-US" altLang="zh-CN" dirty="0" smtClean="0"/>
+              <a:t>Matplotlib</a:t>
+            </a:r>
+            <a:endParaRPr lang="zh-CN" altLang="en-US" dirty="0"/>
+          </a:p>
+        </p:txBody>
+      </p:sp>
+      <p:sp>
+        <p:nvSpPr>
+          <p:cNvPr id="5" name="矩形 4"/>
+          <p:cNvSpPr/>
+          <p:nvPr/>
+        </p:nvSpPr>
+        <p:spPr>
+          <a:xfrm>
+            <a:off x="971600" y="2132856"/>
+            <a:ext cx="7488832" cy="4524315"/>
+          </a:xfrm>
+          <a:prstGeom prst="rect">
+            <a:avLst/>
+          </a:prstGeom>
+        </p:spPr>
+        <p:txBody>
+          <a:bodyPr wrap="square">
+            <a:spAutoFit/>
+          </a:bodyPr>
+          <a:lstStyle/>
+          <a:p>
+            <a:r>
+              <a:rPr lang="zh-CN" altLang="en-US" dirty="0"/>
+              <a:t>import matplotlib.pyplot as plt</a:t>
+            </a:r>
+          </a:p>
+          <a:p>
+            <a:r>
+              <a:rPr lang="zh-CN" altLang="en-US" dirty="0"/>
+              <a:t>import numpy as np</a:t>
+            </a:r>
+          </a:p>
+          <a:p>
+            <a:endParaRPr lang="zh-CN" altLang="en-US" dirty="0"/>
+          </a:p>
+          <a:p>
+            <a:r>
+              <a:rPr lang="zh-CN" altLang="en-US" dirty="0"/>
+              <a:t>x = np.arange(9)</a:t>
+            </a:r>
+          </a:p>
+          <a:p>
+            <a:r>
+              <a:rPr lang="zh-CN" altLang="en-US" dirty="0"/>
+              <a:t>y = np.sin(x)</a:t>
+            </a:r>
+          </a:p>
+          <a:p>
+            <a:r>
+              <a:rPr lang="zh-CN" altLang="en-US" dirty="0"/>
+              <a:t>z = np.cos(x)</a:t>
+            </a:r>
+          </a:p>
+          <a:p>
+            <a:r>
+              <a:rPr lang="zh-CN" altLang="en-US" dirty="0"/>
+              <a:t># marker数据点样式，linewidth线宽，linestyle线型样式，color颜色</a:t>
+            </a:r>
+          </a:p>
+          <a:p>
+            <a:r>
+              <a:rPr lang="zh-CN" altLang="en-US" dirty="0"/>
+              <a:t>plt.plot(x, y, marker="*", linewidth=3, linestyle="--", color="orange")</a:t>
+            </a:r>
+          </a:p>
+          <a:p>
+            <a:r>
+              <a:rPr lang="zh-CN" altLang="en-US" dirty="0"/>
+              <a:t>plt.plot(x, z)</a:t>
+            </a:r>
+          </a:p>
+          <a:p>
+            <a:r>
+              <a:rPr lang="zh-CN" altLang="en-US" dirty="0"/>
+              <a:t>plt.title("matplotlib")</a:t>
+            </a:r>
+          </a:p>
+          <a:p>
+            <a:r>
+              <a:rPr lang="zh-CN" altLang="en-US" dirty="0"/>
+              <a:t>plt.xlabel("height")</a:t>
+            </a:r>
+          </a:p>
+          <a:p>
+            <a:r>
+              <a:rPr lang="zh-CN" altLang="en-US" dirty="0"/>
+              <a:t>plt.ylabel("width")</a:t>
+            </a:r>
+          </a:p>
+          <a:p>
+            <a:r>
+              <a:rPr lang="zh-CN" altLang="en-US" dirty="0"/>
+              <a:t># 设置图例</a:t>
+            </a:r>
+          </a:p>
+          <a:p>
+            <a:r>
+              <a:rPr lang="zh-CN" altLang="en-US" dirty="0"/>
+              <a:t>plt.legend(["Y","Z"], loc="upper right")</a:t>
+            </a:r>
+          </a:p>
+          <a:p>
+            <a:r>
+              <a:rPr lang="zh-CN" altLang="en-US" dirty="0"/>
+              <a:t>plt.grid(True)</a:t>
+            </a:r>
+          </a:p>
+          <a:p>
+            <a:r>
+              <a:rPr lang="zh-CN" altLang="en-US" dirty="0"/>
+              <a:t>plt.show()</a:t>
+            </a:r>
+          </a:p>
+        </p:txBody>
+      </p:sp>
+    </p:spTree>
+    <p:extLst>
+      <p:ext uri="{BB962C8B-B14F-4D97-AF65-F5344CB8AC3E}">
+        <p14:creationId xmlns:p14="http://schemas.microsoft.com/office/powerpoint/2010/main" val="945195131"/>
+      </p:ext>
+    </p:extLst>
+  </p:cSld>
+  <p:clrMapOvr>
+    <a:masterClrMapping/>
+  </p:clrMapOvr>
+</p:sld>
+</file>
+
+<file path=ppt/slides/slide28.xml><?xml version="1.0" encoding="utf-8"?>
+<p:sld xmlns:a="http://schemas.openxmlformats.org/drawingml/2006/main" xmlns:r="http://schemas.openxmlformats.org/officeDocument/2006/relationships" xmlns:p="http://schemas.openxmlformats.org/presentationml/2006/main">
+  <p:cSld>
+    <p:spTree>
+      <p:nvGrpSpPr>
+        <p:cNvPr id="1" name=""/>
+        <p:cNvGrpSpPr/>
+        <p:nvPr/>
+      </p:nvGrpSpPr>
+      <p:grpSpPr>
+        <a:xfrm>
+          <a:off x="0" y="0"/>
+          <a:ext cx="0" cy="0"/>
+          <a:chOff x="0" y="0"/>
+          <a:chExt cx="0" cy="0"/>
+        </a:xfrm>
+      </p:grpSpPr>
+      <p:sp>
+        <p:nvSpPr>
+          <p:cNvPr id="2" name="内容占位符 1"/>
+          <p:cNvSpPr>
+            <a:spLocks noGrp="1"/>
+          </p:cNvSpPr>
+          <p:nvPr>
+            <p:ph sz="half" idx="2"/>
+          </p:nvPr>
+        </p:nvSpPr>
+        <p:spPr/>
+        <p:txBody>
+          <a:bodyPr/>
+          <a:lstStyle/>
+          <a:p>
+            <a:pPr marL="342900" indent="-342900">
+              <a:buFont typeface="Wingdings" panose="05000000000000000000" pitchFamily="2" charset="2"/>
+              <a:buChar char="l"/>
+            </a:pPr>
+            <a:r>
+              <a:rPr lang="en-US" altLang="zh-CN" dirty="0" smtClean="0"/>
+              <a:t>Click save as </a:t>
+            </a:r>
+          </a:p>
+          <a:p>
+            <a:pPr marL="342900" indent="-342900">
+              <a:buFont typeface="Wingdings" panose="05000000000000000000" pitchFamily="2" charset="2"/>
+              <a:buChar char="l"/>
+            </a:pPr>
+            <a:r>
+              <a:rPr lang="en-US" altLang="zh-CN" dirty="0" smtClean="0"/>
+              <a:t>“</a:t>
+            </a:r>
+            <a:r>
+              <a:rPr lang="en-US" altLang="zh-CN" dirty="0" err="1" smtClean="0"/>
+              <a:t>png</a:t>
+            </a:r>
+            <a:r>
+              <a:rPr lang="en-US" altLang="zh-CN" dirty="0" smtClean="0"/>
+              <a:t>” or “jpeg” for word file</a:t>
+            </a:r>
+            <a:endParaRPr lang="en-US" altLang="zh-CN" dirty="0"/>
+          </a:p>
+          <a:p>
+            <a:pPr marL="342900" indent="-342900">
+              <a:buFont typeface="Wingdings" panose="05000000000000000000" pitchFamily="2" charset="2"/>
+              <a:buChar char="l"/>
+            </a:pPr>
+            <a:r>
+              <a:rPr lang="en-US" altLang="zh-CN" dirty="0" smtClean="0"/>
+              <a:t>“pdf” for latex file</a:t>
+            </a:r>
+            <a:endParaRPr lang="zh-CN" altLang="en-US" dirty="0"/>
+          </a:p>
+        </p:txBody>
+      </p:sp>
+      <p:sp>
+        <p:nvSpPr>
+          <p:cNvPr id="3" name="标题 2"/>
+          <p:cNvSpPr>
+            <a:spLocks noGrp="1"/>
+          </p:cNvSpPr>
+          <p:nvPr>
+            <p:ph type="title"/>
+          </p:nvPr>
+        </p:nvSpPr>
+        <p:spPr/>
+        <p:txBody>
+          <a:bodyPr/>
+          <a:lstStyle/>
+          <a:p>
+            <a:r>
+              <a:rPr lang="en-US" altLang="zh-CN" dirty="0"/>
+              <a:t>Matplotlib</a:t>
+            </a:r>
+            <a:endParaRPr lang="zh-CN" altLang="en-US" dirty="0"/>
+          </a:p>
+        </p:txBody>
+      </p:sp>
+      <p:pic>
+        <p:nvPicPr>
+          <p:cNvPr id="4" name="图片 3"/>
+          <p:cNvPicPr>
+            <a:picLocks noChangeAspect="1"/>
+          </p:cNvPicPr>
+          <p:nvPr/>
+        </p:nvPicPr>
+        <p:blipFill>
+          <a:blip r:embed="rId2"/>
+          <a:stretch>
+            <a:fillRect/>
+          </a:stretch>
+        </p:blipFill>
+        <p:spPr>
+          <a:xfrm>
+            <a:off x="4716016" y="1283608"/>
+            <a:ext cx="4175327" cy="3765599"/>
+          </a:xfrm>
+          <a:prstGeom prst="rect">
+            <a:avLst/>
+          </a:prstGeom>
+        </p:spPr>
+      </p:pic>
+    </p:spTree>
+    <p:extLst>
+      <p:ext uri="{BB962C8B-B14F-4D97-AF65-F5344CB8AC3E}">
+        <p14:creationId xmlns:p14="http://schemas.microsoft.com/office/powerpoint/2010/main" val="2035913923"/>
+      </p:ext>
+    </p:extLst>
+  </p:cSld>
+  <p:clrMapOvr>
+    <a:masterClrMapping/>
+  </p:clrMapOvr>
+</p:sld>
+</file>
+
+<file path=ppt/slides/slide29.xml><?xml version="1.0" encoding="utf-8"?>
+<p:sld xmlns:a="http://schemas.openxmlformats.org/drawingml/2006/main" xmlns:r="http://schemas.openxmlformats.org/officeDocument/2006/relationships" xmlns:p="http://schemas.openxmlformats.org/presentationml/2006/main">
+  <p:cSld>
+    <p:spTree>
+      <p:nvGrpSpPr>
+        <p:cNvPr id="1" name=""/>
+        <p:cNvGrpSpPr/>
+        <p:nvPr/>
+      </p:nvGrpSpPr>
+      <p:grpSpPr>
+        <a:xfrm>
+          <a:off x="0" y="0"/>
+          <a:ext cx="0" cy="0"/>
+          <a:chOff x="0" y="0"/>
+          <a:chExt cx="0" cy="0"/>
+        </a:xfrm>
+      </p:grpSpPr>
+      <p:sp>
+        <p:nvSpPr>
+          <p:cNvPr id="2" name="内容占位符 1"/>
+          <p:cNvSpPr>
+            <a:spLocks noGrp="1"/>
+          </p:cNvSpPr>
+          <p:nvPr>
+            <p:ph sz="half" idx="2"/>
+          </p:nvPr>
+        </p:nvSpPr>
+        <p:spPr/>
+        <p:txBody>
+          <a:bodyPr/>
+          <a:lstStyle/>
+          <a:p>
+            <a:pPr marL="342900" indent="-342900">
+              <a:buFont typeface="Wingdings" panose="05000000000000000000" pitchFamily="2" charset="2"/>
+              <a:buChar char="l"/>
+            </a:pPr>
+            <a:r>
+              <a:rPr lang="en-US" altLang="zh-CN" dirty="0" smtClean="0"/>
+              <a:t>Scatter plot</a:t>
+            </a:r>
+            <a:endParaRPr lang="zh-CN" altLang="en-US" dirty="0"/>
+          </a:p>
+        </p:txBody>
+      </p:sp>
+      <p:sp>
+        <p:nvSpPr>
+          <p:cNvPr id="3" name="标题 2"/>
+          <p:cNvSpPr>
+            <a:spLocks noGrp="1"/>
+          </p:cNvSpPr>
+          <p:nvPr>
+            <p:ph type="title"/>
+          </p:nvPr>
+        </p:nvSpPr>
+        <p:spPr/>
+        <p:txBody>
+          <a:bodyPr/>
+          <a:lstStyle/>
+          <a:p>
+            <a:r>
+              <a:rPr lang="en-US" altLang="zh-CN" dirty="0"/>
+              <a:t>Matplotlib</a:t>
+            </a:r>
+            <a:endParaRPr lang="zh-CN" altLang="en-US" dirty="0"/>
+          </a:p>
+        </p:txBody>
+      </p:sp>
+      <p:sp>
+        <p:nvSpPr>
+          <p:cNvPr id="4" name="矩形 3"/>
+          <p:cNvSpPr/>
+          <p:nvPr/>
+        </p:nvSpPr>
+        <p:spPr>
+          <a:xfrm>
+            <a:off x="899592" y="1844824"/>
+            <a:ext cx="4572000" cy="3139321"/>
+          </a:xfrm>
+          <a:prstGeom prst="rect">
+            <a:avLst/>
+          </a:prstGeom>
+        </p:spPr>
+        <p:txBody>
+          <a:bodyPr>
+            <a:spAutoFit/>
+          </a:bodyPr>
+          <a:lstStyle/>
+          <a:p>
+            <a:r>
+              <a:rPr lang="zh-CN" altLang="en-US" dirty="0"/>
+              <a:t>import matplotlib.pyplot as plt</a:t>
+            </a:r>
+          </a:p>
+          <a:p>
+            <a:r>
+              <a:rPr lang="zh-CN" altLang="en-US" dirty="0"/>
+              <a:t>import numpy as np</a:t>
+            </a:r>
+          </a:p>
+          <a:p>
+            <a:endParaRPr lang="zh-CN" altLang="en-US" dirty="0"/>
+          </a:p>
+          <a:p>
+            <a:r>
+              <a:rPr lang="zh-CN" altLang="en-US" dirty="0"/>
+              <a:t>x = np.random.rand(10)</a:t>
+            </a:r>
+          </a:p>
+          <a:p>
+            <a:r>
+              <a:rPr lang="zh-CN" altLang="en-US" dirty="0"/>
+              <a:t>y = np.random.rand(10)</a:t>
+            </a:r>
+          </a:p>
+          <a:p>
+            <a:endParaRPr lang="zh-CN" altLang="en-US" dirty="0"/>
+          </a:p>
+          <a:p>
+            <a:r>
+              <a:rPr lang="zh-CN" altLang="en-US" dirty="0"/>
+              <a:t># x = (1.0, 2.0, 3.0,)</a:t>
+            </a:r>
+          </a:p>
+          <a:p>
+            <a:r>
+              <a:rPr lang="zh-CN" altLang="en-US" dirty="0"/>
+              <a:t># y = (11.1, 2.23, 3.14,)</a:t>
+            </a:r>
+          </a:p>
+          <a:p>
+            <a:endParaRPr lang="zh-CN" altLang="en-US" dirty="0"/>
+          </a:p>
+          <a:p>
+            <a:r>
+              <a:rPr lang="zh-CN" altLang="en-US" dirty="0"/>
+              <a:t>plt.scatter(x,y)</a:t>
+            </a:r>
+          </a:p>
+          <a:p>
+            <a:r>
+              <a:rPr lang="zh-CN" altLang="en-US" dirty="0"/>
+              <a:t>plt.show()</a:t>
+            </a:r>
+          </a:p>
+        </p:txBody>
+      </p:sp>
+      <p:pic>
+        <p:nvPicPr>
+          <p:cNvPr id="5" name="图片 4"/>
+          <p:cNvPicPr>
+            <a:picLocks noChangeAspect="1"/>
+          </p:cNvPicPr>
+          <p:nvPr/>
+        </p:nvPicPr>
+        <p:blipFill>
+          <a:blip r:embed="rId3"/>
+          <a:stretch>
+            <a:fillRect/>
+          </a:stretch>
+        </p:blipFill>
+        <p:spPr>
+          <a:xfrm>
+            <a:off x="4283968" y="1305068"/>
+            <a:ext cx="4677875" cy="4218831"/>
+          </a:xfrm>
+          <a:prstGeom prst="rect">
+            <a:avLst/>
+          </a:prstGeom>
+        </p:spPr>
+      </p:pic>
+    </p:spTree>
+    <p:extLst>
+      <p:ext uri="{BB962C8B-B14F-4D97-AF65-F5344CB8AC3E}">
+        <p14:creationId xmlns:p14="http://schemas.microsoft.com/office/powerpoint/2010/main" val="3994733293"/>
+      </p:ext>
+    </p:extLst>
+  </p:cSld>
+  <p:clrMapOvr>
+    <a:masterClrMapping/>
+  </p:clrMapOvr>
+</p:sld>
+</file>
+
+<file path=ppt/slides/slide3.xml><?xml version="1.0" encoding="utf-8"?>
+<p:sld xmlns:a="http://schemas.openxmlformats.org/drawingml/2006/main" xmlns:r="http://schemas.openxmlformats.org/officeDocument/2006/relationships" xmlns:p="http://schemas.openxmlformats.org/presentationml/2006/main">
+  <p:cSld>
+    <p:spTree>
+      <p:nvGrpSpPr>
+        <p:cNvPr id="1" name=""/>
+        <p:cNvGrpSpPr/>
+        <p:nvPr/>
+      </p:nvGrpSpPr>
+      <p:grpSpPr>
+        <a:xfrm>
+          <a:off x="0" y="0"/>
+          <a:ext cx="0" cy="0"/>
+          <a:chOff x="0" y="0"/>
+          <a:chExt cx="0" cy="0"/>
+        </a:xfrm>
+      </p:grpSpPr>
+      <p:sp>
+        <p:nvSpPr>
+          <p:cNvPr id="2" name="内容占位符 1"/>
+          <p:cNvSpPr>
+            <a:spLocks noGrp="1"/>
+          </p:cNvSpPr>
+          <p:nvPr>
+            <p:ph sz="half" idx="2"/>
+          </p:nvPr>
+        </p:nvSpPr>
+        <p:spPr/>
+        <p:txBody>
+          <a:bodyPr/>
+          <a:lstStyle/>
+          <a:p>
+            <a:pPr marL="342900" indent="-342900">
+              <a:buFont typeface="Wingdings" panose="05000000000000000000" pitchFamily="2" charset="2"/>
+              <a:buChar char="l"/>
+            </a:pPr>
+            <a:r>
+              <a:rPr lang="en-US" altLang="zh-CN" dirty="0"/>
+              <a:t>What is </a:t>
+            </a:r>
+            <a:r>
+              <a:rPr lang="en-US" altLang="zh-CN" dirty="0" err="1"/>
+              <a:t>LaTeX</a:t>
+            </a:r>
+            <a:r>
+              <a:rPr lang="en-US" altLang="zh-CN" dirty="0" smtClean="0"/>
+              <a:t>?</a:t>
+            </a:r>
+          </a:p>
+          <a:p>
+            <a:pPr marL="342900" indent="-342900">
+              <a:buFont typeface="Wingdings" panose="05000000000000000000" pitchFamily="2" charset="2"/>
+              <a:buChar char="l"/>
+            </a:pPr>
+            <a:endParaRPr lang="en-US" altLang="zh-CN" dirty="0"/>
+          </a:p>
+          <a:p>
+            <a:pPr marL="342900" indent="-342900">
+              <a:buFont typeface="Wingdings" panose="05000000000000000000" pitchFamily="2" charset="2"/>
+              <a:buChar char="l"/>
+            </a:pPr>
+            <a:endParaRPr lang="en-US" altLang="zh-CN" dirty="0" smtClean="0"/>
+          </a:p>
+          <a:p>
+            <a:pPr marL="342900" indent="-342900">
+              <a:buFont typeface="Wingdings" panose="05000000000000000000" pitchFamily="2" charset="2"/>
+              <a:buChar char="l"/>
+            </a:pPr>
+            <a:endParaRPr lang="en-US" altLang="zh-CN" dirty="0"/>
+          </a:p>
+          <a:p>
+            <a:pPr marL="342900" indent="-342900">
+              <a:buFont typeface="Wingdings" panose="05000000000000000000" pitchFamily="2" charset="2"/>
+              <a:buChar char="l"/>
+            </a:pPr>
+            <a:endParaRPr lang="en-US" altLang="zh-CN" dirty="0" smtClean="0"/>
+          </a:p>
+          <a:p>
+            <a:pPr marL="342900" indent="-342900">
+              <a:buFont typeface="Wingdings" panose="05000000000000000000" pitchFamily="2" charset="2"/>
+              <a:buChar char="l"/>
+            </a:pPr>
+            <a:r>
+              <a:rPr lang="en-US" altLang="zh-CN" dirty="0"/>
+              <a:t>Why use </a:t>
+            </a:r>
+            <a:r>
+              <a:rPr lang="en-US" altLang="zh-CN" dirty="0" err="1"/>
+              <a:t>LaTeX</a:t>
+            </a:r>
+            <a:r>
+              <a:rPr lang="en-US" altLang="zh-CN" dirty="0"/>
+              <a:t>?</a:t>
+            </a:r>
+            <a:endParaRPr lang="zh-CN" altLang="en-US" dirty="0"/>
+          </a:p>
+        </p:txBody>
+      </p:sp>
+      <p:sp>
+        <p:nvSpPr>
+          <p:cNvPr id="3" name="标题 2"/>
+          <p:cNvSpPr>
+            <a:spLocks noGrp="1"/>
+          </p:cNvSpPr>
+          <p:nvPr>
+            <p:ph type="title"/>
+          </p:nvPr>
+        </p:nvSpPr>
+        <p:spPr/>
+        <p:txBody>
+          <a:bodyPr>
+            <a:normAutofit/>
+          </a:bodyPr>
+          <a:lstStyle/>
+          <a:p>
+            <a:r>
+              <a:rPr lang="en-US" altLang="zh-CN" dirty="0"/>
+              <a:t>Set up for </a:t>
+            </a:r>
+            <a:r>
+              <a:rPr lang="en-US" altLang="zh-CN" dirty="0" err="1" smtClean="0"/>
+              <a:t>LaTeX</a:t>
+            </a:r>
+            <a:endParaRPr lang="zh-CN" altLang="en-US" dirty="0"/>
+          </a:p>
+        </p:txBody>
+      </p:sp>
+      <p:sp>
+        <p:nvSpPr>
+          <p:cNvPr id="4" name="矩形 3"/>
+          <p:cNvSpPr/>
+          <p:nvPr/>
+        </p:nvSpPr>
+        <p:spPr>
+          <a:xfrm>
+            <a:off x="827584" y="1879664"/>
+            <a:ext cx="7488832" cy="1477328"/>
+          </a:xfrm>
+          <a:prstGeom prst="rect">
+            <a:avLst/>
+          </a:prstGeom>
+        </p:spPr>
+        <p:txBody>
+          <a:bodyPr wrap="square">
+            <a:spAutoFit/>
+          </a:bodyPr>
+          <a:lstStyle/>
+          <a:p>
+            <a:pPr algn="just"/>
+            <a:r>
+              <a:rPr lang="en-US" altLang="zh-CN" dirty="0" err="1">
+                <a:solidFill>
+                  <a:srgbClr val="24292E"/>
+                </a:solidFill>
+                <a:latin typeface="-apple-system"/>
+              </a:rPr>
+              <a:t>LaTeX</a:t>
+            </a:r>
+            <a:r>
+              <a:rPr lang="en-US" altLang="zh-CN" dirty="0">
+                <a:solidFill>
+                  <a:srgbClr val="24292E"/>
+                </a:solidFill>
+                <a:latin typeface="-apple-system"/>
+              </a:rPr>
+              <a:t>, which is pronounced «</a:t>
+            </a:r>
+            <a:r>
+              <a:rPr lang="en-US" altLang="zh-CN" dirty="0" err="1">
+                <a:solidFill>
+                  <a:srgbClr val="24292E"/>
+                </a:solidFill>
+                <a:latin typeface="-apple-system"/>
+              </a:rPr>
+              <a:t>Lah</a:t>
+            </a:r>
+            <a:r>
+              <a:rPr lang="en-US" altLang="zh-CN" dirty="0">
+                <a:solidFill>
+                  <a:srgbClr val="24292E"/>
+                </a:solidFill>
+                <a:latin typeface="-apple-system"/>
+              </a:rPr>
+              <a:t>-tech» or «Lay-tech» (to rhyme with «blech»), is a document preparation system for high-quality typesetting. It is most often used for medium-to-large technical or scientific documents but it can be used for almost any form of publishing.</a:t>
+            </a:r>
+            <a:endParaRPr lang="zh-CN" altLang="en-US" dirty="0"/>
+          </a:p>
+        </p:txBody>
+      </p:sp>
+      <p:sp>
+        <p:nvSpPr>
+          <p:cNvPr id="5" name="矩形 4"/>
+          <p:cNvSpPr/>
+          <p:nvPr/>
+        </p:nvSpPr>
+        <p:spPr>
+          <a:xfrm>
+            <a:off x="755576" y="3970263"/>
+            <a:ext cx="8388424" cy="2308324"/>
+          </a:xfrm>
+          <a:prstGeom prst="rect">
+            <a:avLst/>
+          </a:prstGeom>
+        </p:spPr>
+        <p:txBody>
+          <a:bodyPr wrap="square">
+            <a:spAutoFit/>
+          </a:bodyPr>
+          <a:lstStyle/>
+          <a:p>
+            <a:pPr marL="285750" indent="-285750">
+              <a:buFont typeface="Wingdings" panose="05000000000000000000" pitchFamily="2" charset="2"/>
+              <a:buChar char="Ø"/>
+            </a:pPr>
+            <a:r>
+              <a:rPr lang="en-US" altLang="zh-CN" dirty="0" err="1" smtClean="0">
+                <a:solidFill>
+                  <a:srgbClr val="24292E"/>
+                </a:solidFill>
+                <a:latin typeface="-apple-system"/>
+              </a:rPr>
+              <a:t>LaTeX</a:t>
+            </a:r>
+            <a:r>
+              <a:rPr lang="en-US" altLang="zh-CN" dirty="0" smtClean="0">
+                <a:solidFill>
+                  <a:srgbClr val="24292E"/>
+                </a:solidFill>
+                <a:latin typeface="-apple-system"/>
+              </a:rPr>
+              <a:t> </a:t>
+            </a:r>
+            <a:r>
+              <a:rPr lang="en-US" altLang="zh-CN" dirty="0">
+                <a:solidFill>
+                  <a:srgbClr val="24292E"/>
+                </a:solidFill>
+                <a:latin typeface="-apple-system"/>
+              </a:rPr>
+              <a:t>is free, multiplatform.</a:t>
+            </a:r>
+          </a:p>
+          <a:p>
+            <a:pPr marL="285750" indent="-285750">
+              <a:buFont typeface="Wingdings" panose="05000000000000000000" pitchFamily="2" charset="2"/>
+              <a:buChar char="Ø"/>
+            </a:pPr>
+            <a:r>
+              <a:rPr lang="en-US" altLang="zh-CN" dirty="0" err="1">
+                <a:solidFill>
+                  <a:srgbClr val="24292E"/>
+                </a:solidFill>
+                <a:latin typeface="-apple-system"/>
+              </a:rPr>
+              <a:t>LaTeX</a:t>
+            </a:r>
+            <a:r>
+              <a:rPr lang="en-US" altLang="zh-CN" dirty="0">
+                <a:solidFill>
+                  <a:srgbClr val="24292E"/>
+                </a:solidFill>
+                <a:latin typeface="-apple-system"/>
+              </a:rPr>
+              <a:t> is just a text document (which can be opened by any text editor), readily converted to PDF.</a:t>
+            </a:r>
+          </a:p>
+          <a:p>
+            <a:pPr marL="285750" indent="-285750">
+              <a:buFont typeface="Wingdings" panose="05000000000000000000" pitchFamily="2" charset="2"/>
+              <a:buChar char="Ø"/>
+            </a:pPr>
+            <a:r>
+              <a:rPr lang="en-US" altLang="zh-CN" dirty="0" err="1">
+                <a:solidFill>
+                  <a:srgbClr val="24292E"/>
+                </a:solidFill>
+                <a:latin typeface="-apple-system"/>
+              </a:rPr>
+              <a:t>LaTeX</a:t>
+            </a:r>
+            <a:r>
+              <a:rPr lang="en-US" altLang="zh-CN" dirty="0">
+                <a:solidFill>
+                  <a:srgbClr val="24292E"/>
+                </a:solidFill>
+                <a:latin typeface="-apple-system"/>
+              </a:rPr>
+              <a:t> separates content and style. Style once, then focus on content.</a:t>
+            </a:r>
+          </a:p>
+          <a:p>
+            <a:pPr marL="285750" indent="-285750">
+              <a:buFont typeface="Wingdings" panose="05000000000000000000" pitchFamily="2" charset="2"/>
+              <a:buChar char="Ø"/>
+            </a:pPr>
+            <a:r>
+              <a:rPr lang="en-US" altLang="zh-CN" dirty="0">
+                <a:solidFill>
+                  <a:srgbClr val="24292E"/>
+                </a:solidFill>
+                <a:latin typeface="-apple-system"/>
+              </a:rPr>
+              <a:t>The workflow is faster compared to MS Word.</a:t>
+            </a:r>
+          </a:p>
+          <a:p>
+            <a:pPr marL="285750" indent="-285750">
+              <a:buFont typeface="Wingdings" panose="05000000000000000000" pitchFamily="2" charset="2"/>
+              <a:buChar char="Ø"/>
+            </a:pPr>
+            <a:r>
+              <a:rPr lang="en-US" altLang="zh-CN" dirty="0" err="1">
+                <a:solidFill>
+                  <a:srgbClr val="24292E"/>
+                </a:solidFill>
+                <a:latin typeface="-apple-system"/>
+              </a:rPr>
+              <a:t>LaTeX</a:t>
+            </a:r>
+            <a:r>
+              <a:rPr lang="en-US" altLang="zh-CN" dirty="0">
+                <a:solidFill>
+                  <a:srgbClr val="24292E"/>
+                </a:solidFill>
+                <a:latin typeface="-apple-system"/>
+              </a:rPr>
+              <a:t> is widely used for scientific topics.</a:t>
+            </a:r>
+          </a:p>
+          <a:p>
+            <a:pPr marL="285750" indent="-285750">
+              <a:buFont typeface="Wingdings" panose="05000000000000000000" pitchFamily="2" charset="2"/>
+              <a:buChar char="Ø"/>
+            </a:pPr>
+            <a:r>
+              <a:rPr lang="en-US" altLang="zh-CN" dirty="0" err="1">
+                <a:solidFill>
+                  <a:srgbClr val="24292E"/>
+                </a:solidFill>
+                <a:latin typeface="-apple-system"/>
+              </a:rPr>
+              <a:t>LaTeX</a:t>
+            </a:r>
+            <a:r>
+              <a:rPr lang="en-US" altLang="zh-CN" dirty="0">
+                <a:solidFill>
+                  <a:srgbClr val="24292E"/>
+                </a:solidFill>
+                <a:latin typeface="-apple-system"/>
+              </a:rPr>
+              <a:t> is simply the best option when it comes to typesetting math expressions.</a:t>
+            </a:r>
+            <a:endParaRPr lang="en-US" altLang="zh-CN" b="0" i="0" dirty="0">
+              <a:solidFill>
+                <a:srgbClr val="24292E"/>
+              </a:solidFill>
+              <a:effectLst/>
+              <a:latin typeface="-apple-system"/>
+            </a:endParaRPr>
+          </a:p>
+        </p:txBody>
+      </p:sp>
+    </p:spTree>
+    <p:extLst>
+      <p:ext uri="{BB962C8B-B14F-4D97-AF65-F5344CB8AC3E}">
+        <p14:creationId xmlns:p14="http://schemas.microsoft.com/office/powerpoint/2010/main" val="1365063806"/>
+      </p:ext>
+    </p:extLst>
+  </p:cSld>
+  <p:clrMapOvr>
+    <a:masterClrMapping/>
+  </p:clrMapOvr>
+</p:sld>
+</file>
+
+<file path=ppt/slides/slide30.xml><?xml version="1.0" encoding="utf-8"?>
+<p:sld xmlns:a="http://schemas.openxmlformats.org/drawingml/2006/main" xmlns:r="http://schemas.openxmlformats.org/officeDocument/2006/relationships" xmlns:p="http://schemas.openxmlformats.org/presentationml/2006/main">
+  <p:cSld>
+    <p:spTree>
+      <p:nvGrpSpPr>
+        <p:cNvPr id="1" name=""/>
+        <p:cNvGrpSpPr/>
+        <p:nvPr/>
+      </p:nvGrpSpPr>
+      <p:grpSpPr>
+        <a:xfrm>
+          <a:off x="0" y="0"/>
+          <a:ext cx="0" cy="0"/>
+          <a:chOff x="0" y="0"/>
+          <a:chExt cx="0" cy="0"/>
+        </a:xfrm>
+      </p:grpSpPr>
+      <p:sp>
+        <p:nvSpPr>
+          <p:cNvPr id="2" name="内容占位符 1"/>
+          <p:cNvSpPr>
+            <a:spLocks noGrp="1"/>
+          </p:cNvSpPr>
+          <p:nvPr>
+            <p:ph sz="half" idx="2"/>
+          </p:nvPr>
+        </p:nvSpPr>
+        <p:spPr/>
+        <p:txBody>
+          <a:bodyPr/>
+          <a:lstStyle/>
+          <a:p>
+            <a:pPr marL="342900" indent="-342900">
+              <a:buFont typeface="Wingdings" panose="05000000000000000000" pitchFamily="2" charset="2"/>
+              <a:buChar char="l"/>
+            </a:pPr>
+            <a:r>
+              <a:rPr lang="en-US" altLang="zh-CN" dirty="0" smtClean="0"/>
+              <a:t>Bar</a:t>
+            </a:r>
+            <a:endParaRPr lang="zh-CN" altLang="en-US" dirty="0"/>
+          </a:p>
+        </p:txBody>
+      </p:sp>
+      <p:sp>
+        <p:nvSpPr>
+          <p:cNvPr id="3" name="标题 2"/>
+          <p:cNvSpPr>
+            <a:spLocks noGrp="1"/>
+          </p:cNvSpPr>
+          <p:nvPr>
+            <p:ph type="title"/>
+          </p:nvPr>
+        </p:nvSpPr>
+        <p:spPr/>
+        <p:txBody>
+          <a:bodyPr/>
+          <a:lstStyle/>
+          <a:p>
+            <a:r>
+              <a:rPr lang="en-US" altLang="zh-CN" dirty="0"/>
+              <a:t>Matplotlib</a:t>
+            </a:r>
+            <a:endParaRPr lang="zh-CN" altLang="en-US" dirty="0"/>
+          </a:p>
+        </p:txBody>
+      </p:sp>
+      <p:sp>
+        <p:nvSpPr>
+          <p:cNvPr id="4" name="矩形 3"/>
+          <p:cNvSpPr/>
+          <p:nvPr/>
+        </p:nvSpPr>
+        <p:spPr>
+          <a:xfrm>
+            <a:off x="755576" y="1916832"/>
+            <a:ext cx="4572000" cy="2031325"/>
+          </a:xfrm>
+          <a:prstGeom prst="rect">
+            <a:avLst/>
+          </a:prstGeom>
+        </p:spPr>
+        <p:txBody>
+          <a:bodyPr>
+            <a:spAutoFit/>
+          </a:bodyPr>
+          <a:lstStyle/>
+          <a:p>
+            <a:r>
+              <a:rPr lang="zh-CN" altLang="en-US" dirty="0"/>
+              <a:t>import matplotlib.pyplot as plt</a:t>
+            </a:r>
+          </a:p>
+          <a:p>
+            <a:r>
+              <a:rPr lang="zh-CN" altLang="en-US" dirty="0"/>
+              <a:t>import numpy as np</a:t>
+            </a:r>
+          </a:p>
+          <a:p>
+            <a:endParaRPr lang="zh-CN" altLang="en-US" dirty="0"/>
+          </a:p>
+          <a:p>
+            <a:r>
+              <a:rPr lang="zh-CN" altLang="en-US" dirty="0"/>
+              <a:t>x = np.arange(10)</a:t>
+            </a:r>
+          </a:p>
+          <a:p>
+            <a:r>
+              <a:rPr lang="zh-CN" altLang="en-US" dirty="0"/>
+              <a:t>y = np.random.randint(0,30,10)</a:t>
+            </a:r>
+          </a:p>
+          <a:p>
+            <a:r>
+              <a:rPr lang="zh-CN" altLang="en-US" dirty="0"/>
+              <a:t>plt.bar(x, y)</a:t>
+            </a:r>
+          </a:p>
+          <a:p>
+            <a:r>
+              <a:rPr lang="zh-CN" altLang="en-US" dirty="0"/>
+              <a:t>plt.show()</a:t>
+            </a:r>
+          </a:p>
+        </p:txBody>
+      </p:sp>
+      <p:pic>
+        <p:nvPicPr>
+          <p:cNvPr id="5" name="图片 4"/>
+          <p:cNvPicPr>
+            <a:picLocks noChangeAspect="1"/>
+          </p:cNvPicPr>
+          <p:nvPr/>
+        </p:nvPicPr>
+        <p:blipFill>
+          <a:blip r:embed="rId2"/>
+          <a:stretch>
+            <a:fillRect/>
+          </a:stretch>
+        </p:blipFill>
+        <p:spPr>
+          <a:xfrm>
+            <a:off x="4342951" y="1268760"/>
+            <a:ext cx="4015641" cy="3621583"/>
+          </a:xfrm>
+          <a:prstGeom prst="rect">
+            <a:avLst/>
+          </a:prstGeom>
+        </p:spPr>
+      </p:pic>
+    </p:spTree>
+    <p:extLst>
+      <p:ext uri="{BB962C8B-B14F-4D97-AF65-F5344CB8AC3E}">
+        <p14:creationId xmlns:p14="http://schemas.microsoft.com/office/powerpoint/2010/main" val="1166741429"/>
+      </p:ext>
+    </p:extLst>
+  </p:cSld>
+  <p:clrMapOvr>
+    <a:masterClrMapping/>
+  </p:clrMapOvr>
+</p:sld>
+</file>
+
+<file path=ppt/slides/slide31.xml><?xml version="1.0" encoding="utf-8"?>
+<p:sld xmlns:a="http://schemas.openxmlformats.org/drawingml/2006/main" xmlns:r="http://schemas.openxmlformats.org/officeDocument/2006/relationships" xmlns:p="http://schemas.openxmlformats.org/presentationml/2006/main">
+  <p:cSld>
+    <p:spTree>
+      <p:nvGrpSpPr>
+        <p:cNvPr id="1" name=""/>
+        <p:cNvGrpSpPr/>
+        <p:nvPr/>
+      </p:nvGrpSpPr>
+      <p:grpSpPr>
+        <a:xfrm>
+          <a:off x="0" y="0"/>
+          <a:ext cx="0" cy="0"/>
+          <a:chOff x="0" y="0"/>
+          <a:chExt cx="0" cy="0"/>
+        </a:xfrm>
+      </p:grpSpPr>
+      <p:sp>
+        <p:nvSpPr>
+          <p:cNvPr id="2" name="内容占位符 1"/>
+          <p:cNvSpPr>
+            <a:spLocks noGrp="1"/>
+          </p:cNvSpPr>
+          <p:nvPr>
+            <p:ph sz="half" idx="2"/>
+          </p:nvPr>
+        </p:nvSpPr>
+        <p:spPr/>
+        <p:txBody>
+          <a:bodyPr/>
+          <a:lstStyle/>
+          <a:p>
+            <a:pPr marL="342900" indent="-342900">
+              <a:buFont typeface="Wingdings" panose="05000000000000000000" pitchFamily="2" charset="2"/>
+              <a:buChar char="l"/>
+            </a:pPr>
+            <a:r>
+              <a:rPr lang="en-US" altLang="zh-CN" dirty="0" smtClean="0"/>
+              <a:t>Histogram</a:t>
+            </a:r>
+          </a:p>
+          <a:p>
+            <a:endParaRPr lang="zh-CN" altLang="en-US" dirty="0"/>
+          </a:p>
+        </p:txBody>
+      </p:sp>
+      <p:sp>
+        <p:nvSpPr>
+          <p:cNvPr id="3" name="标题 2"/>
+          <p:cNvSpPr>
+            <a:spLocks noGrp="1"/>
+          </p:cNvSpPr>
+          <p:nvPr>
+            <p:ph type="title"/>
+          </p:nvPr>
+        </p:nvSpPr>
+        <p:spPr/>
+        <p:txBody>
+          <a:bodyPr/>
+          <a:lstStyle/>
+          <a:p>
+            <a:r>
+              <a:rPr lang="en-US" altLang="zh-CN" dirty="0"/>
+              <a:t>Matplotlib</a:t>
+            </a:r>
+            <a:endParaRPr lang="zh-CN" altLang="en-US" dirty="0"/>
+          </a:p>
+        </p:txBody>
+      </p:sp>
+      <p:sp>
+        <p:nvSpPr>
+          <p:cNvPr id="5" name="矩形 4"/>
+          <p:cNvSpPr/>
+          <p:nvPr/>
+        </p:nvSpPr>
+        <p:spPr>
+          <a:xfrm>
+            <a:off x="827584" y="1844824"/>
+            <a:ext cx="4572000" cy="2031325"/>
+          </a:xfrm>
+          <a:prstGeom prst="rect">
+            <a:avLst/>
+          </a:prstGeom>
+        </p:spPr>
+        <p:txBody>
+          <a:bodyPr>
+            <a:spAutoFit/>
+          </a:bodyPr>
+          <a:lstStyle/>
+          <a:p>
+            <a:r>
+              <a:rPr lang="en-US" altLang="zh-CN" dirty="0"/>
+              <a:t>import </a:t>
+            </a:r>
+            <a:r>
+              <a:rPr lang="en-US" altLang="zh-CN" dirty="0" err="1"/>
+              <a:t>matplotlib.pyplot</a:t>
+            </a:r>
+            <a:r>
+              <a:rPr lang="en-US" altLang="zh-CN" dirty="0"/>
+              <a:t> as </a:t>
+            </a:r>
+            <a:r>
+              <a:rPr lang="en-US" altLang="zh-CN" dirty="0" err="1"/>
+              <a:t>plt</a:t>
+            </a:r>
+            <a:endParaRPr lang="en-US" altLang="zh-CN" dirty="0"/>
+          </a:p>
+          <a:p>
+            <a:r>
+              <a:rPr lang="en-US" altLang="zh-CN" dirty="0"/>
+              <a:t>import </a:t>
+            </a:r>
+            <a:r>
+              <a:rPr lang="en-US" altLang="zh-CN" dirty="0" err="1"/>
+              <a:t>numpy</a:t>
+            </a:r>
+            <a:r>
+              <a:rPr lang="en-US" altLang="zh-CN" dirty="0"/>
+              <a:t> as np</a:t>
+            </a:r>
+          </a:p>
+          <a:p>
+            <a:endParaRPr lang="en-US" altLang="zh-CN" dirty="0"/>
+          </a:p>
+          <a:p>
+            <a:r>
+              <a:rPr lang="en-US" altLang="zh-CN" dirty="0"/>
+              <a:t>mean, sigma = 0, 1</a:t>
+            </a:r>
+          </a:p>
+          <a:p>
+            <a:r>
+              <a:rPr lang="en-US" altLang="zh-CN" dirty="0"/>
+              <a:t>x = mean + sigma * </a:t>
+            </a:r>
+            <a:r>
+              <a:rPr lang="en-US" altLang="zh-CN" dirty="0" err="1"/>
+              <a:t>np.random.randn</a:t>
+            </a:r>
+            <a:r>
+              <a:rPr lang="en-US" altLang="zh-CN" dirty="0"/>
+              <a:t>(10000)</a:t>
+            </a:r>
+          </a:p>
+          <a:p>
+            <a:r>
+              <a:rPr lang="en-US" altLang="zh-CN" dirty="0" err="1"/>
+              <a:t>plt.hist</a:t>
+            </a:r>
+            <a:r>
+              <a:rPr lang="en-US" altLang="zh-CN" dirty="0"/>
+              <a:t>(x,50)</a:t>
+            </a:r>
+          </a:p>
+          <a:p>
+            <a:r>
+              <a:rPr lang="en-US" altLang="zh-CN" dirty="0" err="1"/>
+              <a:t>plt.show</a:t>
+            </a:r>
+            <a:r>
+              <a:rPr lang="en-US" altLang="zh-CN" dirty="0"/>
+              <a:t>()</a:t>
+            </a:r>
+            <a:endParaRPr lang="zh-CN" altLang="en-US" dirty="0"/>
+          </a:p>
+        </p:txBody>
+      </p:sp>
+      <p:pic>
+        <p:nvPicPr>
+          <p:cNvPr id="6" name="图片 5"/>
+          <p:cNvPicPr>
+            <a:picLocks noChangeAspect="1"/>
+          </p:cNvPicPr>
+          <p:nvPr/>
+        </p:nvPicPr>
+        <p:blipFill>
+          <a:blip r:embed="rId2"/>
+          <a:stretch>
+            <a:fillRect/>
+          </a:stretch>
+        </p:blipFill>
+        <p:spPr>
+          <a:xfrm>
+            <a:off x="5195058" y="1412776"/>
+            <a:ext cx="3696269" cy="3333551"/>
+          </a:xfrm>
+          <a:prstGeom prst="rect">
+            <a:avLst/>
+          </a:prstGeom>
+        </p:spPr>
+      </p:pic>
+    </p:spTree>
+    <p:extLst>
+      <p:ext uri="{BB962C8B-B14F-4D97-AF65-F5344CB8AC3E}">
+        <p14:creationId xmlns:p14="http://schemas.microsoft.com/office/powerpoint/2010/main" val="699329851"/>
+      </p:ext>
+    </p:extLst>
+  </p:cSld>
+  <p:clrMapOvr>
+    <a:masterClrMapping/>
+  </p:clrMapOvr>
+</p:sld>
+</file>
+
+<file path=ppt/slides/slide32.xml><?xml version="1.0" encoding="utf-8"?>
+<p:sld xmlns:a="http://schemas.openxmlformats.org/drawingml/2006/main" xmlns:r="http://schemas.openxmlformats.org/officeDocument/2006/relationships" xmlns:p="http://schemas.openxmlformats.org/presentationml/2006/main">
+  <p:cSld>
+    <p:spTree>
+      <p:nvGrpSpPr>
+        <p:cNvPr id="1" name=""/>
+        <p:cNvGrpSpPr/>
+        <p:nvPr/>
+      </p:nvGrpSpPr>
+      <p:grpSpPr>
+        <a:xfrm>
+          <a:off x="0" y="0"/>
+          <a:ext cx="0" cy="0"/>
+          <a:chOff x="0" y="0"/>
+          <a:chExt cx="0" cy="0"/>
+        </a:xfrm>
+      </p:grpSpPr>
+      <p:sp>
+        <p:nvSpPr>
+          <p:cNvPr id="2" name="内容占位符 1"/>
+          <p:cNvSpPr>
+            <a:spLocks noGrp="1"/>
+          </p:cNvSpPr>
+          <p:nvPr>
+            <p:ph sz="half" idx="2"/>
+          </p:nvPr>
+        </p:nvSpPr>
+        <p:spPr/>
+        <p:txBody>
+          <a:bodyPr/>
+          <a:lstStyle/>
+          <a:p>
+            <a:pPr marL="342900" indent="-342900">
+              <a:buFont typeface="Wingdings" panose="05000000000000000000" pitchFamily="2" charset="2"/>
+              <a:buChar char="l"/>
+            </a:pPr>
+            <a:r>
+              <a:rPr lang="en-US" altLang="zh-CN" dirty="0" smtClean="0"/>
+              <a:t>Advanced example - bar</a:t>
+            </a:r>
+            <a:endParaRPr lang="zh-CN" altLang="en-US" dirty="0"/>
+          </a:p>
+        </p:txBody>
+      </p:sp>
+      <p:sp>
+        <p:nvSpPr>
+          <p:cNvPr id="3" name="标题 2"/>
+          <p:cNvSpPr>
+            <a:spLocks noGrp="1"/>
+          </p:cNvSpPr>
+          <p:nvPr>
+            <p:ph type="title"/>
+          </p:nvPr>
+        </p:nvSpPr>
+        <p:spPr/>
+        <p:txBody>
+          <a:bodyPr/>
+          <a:lstStyle/>
+          <a:p>
+            <a:r>
+              <a:rPr lang="en-US" altLang="zh-CN" dirty="0"/>
+              <a:t>Matplotlib</a:t>
+            </a:r>
+            <a:endParaRPr lang="zh-CN" altLang="en-US" dirty="0"/>
+          </a:p>
+        </p:txBody>
+      </p:sp>
+      <p:sp>
+        <p:nvSpPr>
+          <p:cNvPr id="4" name="矩形 3"/>
+          <p:cNvSpPr/>
+          <p:nvPr/>
+        </p:nvSpPr>
+        <p:spPr>
+          <a:xfrm>
+            <a:off x="827584" y="1772816"/>
+            <a:ext cx="7920880" cy="4801314"/>
+          </a:xfrm>
+          <a:prstGeom prst="rect">
+            <a:avLst/>
+          </a:prstGeom>
+        </p:spPr>
+        <p:txBody>
+          <a:bodyPr wrap="square">
+            <a:spAutoFit/>
+          </a:bodyPr>
+          <a:lstStyle/>
+          <a:p>
+            <a:r>
+              <a:rPr lang="zh-CN" altLang="en-US" dirty="0"/>
+              <a:t>import numpy as np</a:t>
+            </a:r>
+          </a:p>
+          <a:p>
+            <a:r>
+              <a:rPr lang="zh-CN" altLang="en-US" dirty="0"/>
+              <a:t>import matplotlib.pyplot as plt</a:t>
+            </a:r>
+          </a:p>
+          <a:p>
+            <a:endParaRPr lang="zh-CN" altLang="en-US" dirty="0"/>
+          </a:p>
+          <a:p>
+            <a:r>
+              <a:rPr lang="zh-CN" altLang="en-US" dirty="0"/>
+              <a:t>font = {'family' : 'Times New Roman', 'color'  : 'black',\</a:t>
+            </a:r>
+          </a:p>
+          <a:p>
+            <a:r>
+              <a:rPr lang="zh-CN" altLang="en-US" dirty="0"/>
+              <a:t>         'weight' : 'normal', 'size'   : 20}</a:t>
+            </a:r>
+          </a:p>
+          <a:p>
+            <a:endParaRPr lang="zh-CN" altLang="en-US" dirty="0"/>
+          </a:p>
+          <a:p>
+            <a:r>
+              <a:rPr lang="zh-CN" altLang="en-US" dirty="0"/>
+              <a:t>n_groups = 4</a:t>
+            </a:r>
+          </a:p>
+          <a:p>
+            <a:endParaRPr lang="zh-CN" altLang="en-US" dirty="0"/>
+          </a:p>
+          <a:p>
+            <a:r>
+              <a:rPr lang="zh-CN" altLang="en-US" dirty="0"/>
+              <a:t>means_nn = (0.743, 0.720, 0.913, 0.900)</a:t>
+            </a:r>
+          </a:p>
+          <a:p>
+            <a:r>
+              <a:rPr lang="zh-CN" altLang="en-US" dirty="0"/>
+              <a:t>means_ecnu = (0.734, 0.686, 0.884, 0.845)</a:t>
+            </a:r>
+          </a:p>
+          <a:p>
+            <a:r>
+              <a:rPr lang="zh-CN" altLang="en-US" dirty="0"/>
+              <a:t>means_uwb = (0.644, 0.657, 0.846, 0.849)</a:t>
+            </a:r>
+          </a:p>
+          <a:p>
+            <a:r>
+              <a:rPr lang="zh-CN" altLang="en-US" dirty="0"/>
+              <a:t>means_lsis = (0.421, 0.324, 0.599, 0.462)</a:t>
+            </a:r>
+          </a:p>
+          <a:p>
+            <a:endParaRPr lang="zh-CN" altLang="en-US" dirty="0"/>
+          </a:p>
+          <a:p>
+            <a:r>
+              <a:rPr lang="zh-CN" altLang="en-US" dirty="0"/>
+              <a:t>fig, ax = plt.subplots()</a:t>
+            </a:r>
+          </a:p>
+          <a:p>
+            <a:r>
+              <a:rPr lang="zh-CN" altLang="en-US" dirty="0"/>
+              <a:t>index = np.arange(n_groups)</a:t>
+            </a:r>
+          </a:p>
+          <a:p>
+            <a:r>
+              <a:rPr lang="zh-CN" altLang="en-US" dirty="0"/>
+              <a:t>bar_width = 0.2</a:t>
+            </a:r>
+          </a:p>
+          <a:p>
+            <a:endParaRPr lang="zh-CN" altLang="en-US" dirty="0"/>
+          </a:p>
+        </p:txBody>
+      </p:sp>
+    </p:spTree>
+    <p:extLst>
+      <p:ext uri="{BB962C8B-B14F-4D97-AF65-F5344CB8AC3E}">
+        <p14:creationId xmlns:p14="http://schemas.microsoft.com/office/powerpoint/2010/main" val="532303872"/>
+      </p:ext>
+    </p:extLst>
+  </p:cSld>
+  <p:clrMapOvr>
+    <a:masterClrMapping/>
+  </p:clrMapOvr>
+</p:sld>
+</file>
+
+<file path=ppt/slides/slide33.xml><?xml version="1.0" encoding="utf-8"?>
+<p:sld xmlns:a="http://schemas.openxmlformats.org/drawingml/2006/main" xmlns:r="http://schemas.openxmlformats.org/officeDocument/2006/relationships" xmlns:p="http://schemas.openxmlformats.org/presentationml/2006/main">
+  <p:cSld>
+    <p:spTree>
+      <p:nvGrpSpPr>
+        <p:cNvPr id="1" name=""/>
+        <p:cNvGrpSpPr/>
+        <p:nvPr/>
+      </p:nvGrpSpPr>
+      <p:grpSpPr>
+        <a:xfrm>
+          <a:off x="0" y="0"/>
+          <a:ext cx="0" cy="0"/>
+          <a:chOff x="0" y="0"/>
+          <a:chExt cx="0" cy="0"/>
+        </a:xfrm>
+      </p:grpSpPr>
+      <p:sp>
+        <p:nvSpPr>
+          <p:cNvPr id="2" name="内容占位符 1"/>
+          <p:cNvSpPr>
+            <a:spLocks noGrp="1"/>
+          </p:cNvSpPr>
+          <p:nvPr>
+            <p:ph sz="half" idx="2"/>
+          </p:nvPr>
+        </p:nvSpPr>
+        <p:spPr/>
+        <p:txBody>
+          <a:bodyPr/>
+          <a:lstStyle/>
+          <a:p>
+            <a:pPr marL="342900" indent="-342900">
+              <a:buFont typeface="Wingdings" panose="05000000000000000000" pitchFamily="2" charset="2"/>
+              <a:buChar char="l"/>
+            </a:pPr>
+            <a:r>
+              <a:rPr lang="en-US" altLang="zh-CN" dirty="0" smtClean="0"/>
+              <a:t>Latex math in </a:t>
+            </a:r>
+            <a:r>
+              <a:rPr lang="en-US" altLang="zh-CN" dirty="0" err="1" smtClean="0"/>
+              <a:t>xticks</a:t>
+            </a:r>
+            <a:r>
+              <a:rPr lang="en-US" altLang="zh-CN" dirty="0" smtClean="0"/>
+              <a:t> and </a:t>
+            </a:r>
+            <a:r>
+              <a:rPr lang="en-US" altLang="zh-CN" dirty="0" err="1" smtClean="0"/>
+              <a:t>yticks</a:t>
+            </a:r>
+            <a:endParaRPr lang="zh-CN" altLang="en-US" dirty="0"/>
+          </a:p>
+        </p:txBody>
+      </p:sp>
+      <p:sp>
+        <p:nvSpPr>
+          <p:cNvPr id="3" name="标题 2"/>
+          <p:cNvSpPr>
+            <a:spLocks noGrp="1"/>
+          </p:cNvSpPr>
+          <p:nvPr>
+            <p:ph type="title"/>
+          </p:nvPr>
+        </p:nvSpPr>
+        <p:spPr/>
+        <p:txBody>
+          <a:bodyPr/>
+          <a:lstStyle/>
+          <a:p>
+            <a:r>
+              <a:rPr lang="en-US" altLang="zh-CN" dirty="0"/>
+              <a:t>Matplotlib</a:t>
+            </a:r>
+            <a:endParaRPr lang="zh-CN" altLang="en-US" dirty="0"/>
+          </a:p>
+        </p:txBody>
+      </p:sp>
+      <p:sp>
+        <p:nvSpPr>
+          <p:cNvPr id="4" name="矩形 3"/>
+          <p:cNvSpPr/>
+          <p:nvPr/>
+        </p:nvSpPr>
+        <p:spPr>
+          <a:xfrm>
+            <a:off x="539552" y="1844824"/>
+            <a:ext cx="8507288" cy="4801314"/>
+          </a:xfrm>
+          <a:prstGeom prst="rect">
+            <a:avLst/>
+          </a:prstGeom>
+        </p:spPr>
+        <p:txBody>
+          <a:bodyPr wrap="square">
+            <a:spAutoFit/>
+          </a:bodyPr>
+          <a:lstStyle/>
+          <a:p>
+            <a:r>
+              <a:rPr lang="zh-CN" altLang="en-US" dirty="0"/>
+              <a:t>opacity = 0.6</a:t>
+            </a:r>
+          </a:p>
+          <a:p>
+            <a:r>
+              <a:rPr lang="zh-CN" altLang="en-US" dirty="0"/>
+              <a:t>rects1 = plt.bar(index, means_nn, bar_width, color='b', label='NN', alpha=0.7)</a:t>
+            </a:r>
+          </a:p>
+          <a:p>
+            <a:r>
+              <a:rPr lang="zh-CN" altLang="en-US" dirty="0"/>
+              <a:t>rects2 = plt.bar(index + bar_width, means_ecnu, bar_width, color='r', label='L2R (ECNU)', alpha=0.7)</a:t>
+            </a:r>
+          </a:p>
+          <a:p>
+            <a:r>
+              <a:rPr lang="zh-CN" altLang="en-US" dirty="0"/>
+              <a:t>rects3 = plt.bar(index + 2 * bar_width, means_uwb, bar_width, color='g', label='GP-Reg (UWB)', alpha=0.7)</a:t>
+            </a:r>
+          </a:p>
+          <a:p>
+            <a:r>
+              <a:rPr lang="zh-CN" altLang="en-US" dirty="0"/>
+              <a:t>rects4 = plt.bar(index + 3 * bar_width, means_lsis, bar_width, color='c', label='PMI (LSIS)', alpha=0.7)</a:t>
+            </a:r>
+          </a:p>
+          <a:p>
+            <a:endParaRPr lang="zh-CN" altLang="en-US" dirty="0"/>
+          </a:p>
+          <a:p>
+            <a:r>
+              <a:rPr lang="zh-CN" altLang="en-US" dirty="0"/>
+              <a:t># plt.xlabel('Metrics', fontdict=font)  </a:t>
+            </a:r>
+          </a:p>
+          <a:p>
+            <a:r>
+              <a:rPr lang="zh-CN" altLang="en-US" dirty="0"/>
+              <a:t># plt.ylabel('Scores', fontdict=font)  </a:t>
+            </a:r>
+          </a:p>
+          <a:p>
+            <a:r>
+              <a:rPr lang="zh-CN" altLang="en-US" dirty="0"/>
+              <a:t># plt.title('Scores by group and gender')  </a:t>
+            </a:r>
+          </a:p>
+          <a:p>
+            <a:r>
+              <a:rPr lang="zh-CN" altLang="en-US" dirty="0"/>
+              <a:t>plt.xticks(0.2 + index + bar_width, ('Word\n Kendall\'s $\\tau $',\</a:t>
+            </a:r>
+          </a:p>
+          <a:p>
+            <a:r>
+              <a:rPr lang="zh-CN" altLang="en-US" dirty="0"/>
+              <a:t>    'Phrase\n Kendall\'s $\\tau $', \</a:t>
+            </a:r>
+          </a:p>
+          <a:p>
+            <a:r>
+              <a:rPr lang="zh-CN" altLang="en-US" dirty="0"/>
+              <a:t>    'Word\n Spearman\'s $\\rho $', \</a:t>
+            </a:r>
+          </a:p>
+          <a:p>
+            <a:r>
+              <a:rPr lang="zh-CN" altLang="en-US" dirty="0"/>
+              <a:t>    'Phrase\n Spearman\'s $\\rho $'), </a:t>
+            </a:r>
+          </a:p>
+          <a:p>
+            <a:r>
+              <a:rPr lang="zh-CN" altLang="en-US" dirty="0"/>
+              <a:t> family = 'Times New Roman', fontsize=13)</a:t>
+            </a:r>
+          </a:p>
+        </p:txBody>
+      </p:sp>
+    </p:spTree>
+    <p:extLst>
+      <p:ext uri="{BB962C8B-B14F-4D97-AF65-F5344CB8AC3E}">
+        <p14:creationId xmlns:p14="http://schemas.microsoft.com/office/powerpoint/2010/main" val="886239517"/>
+      </p:ext>
+    </p:extLst>
+  </p:cSld>
+  <p:clrMapOvr>
+    <a:masterClrMapping/>
+  </p:clrMapOvr>
+</p:sld>
+</file>
+
+<file path=ppt/slides/slide34.xml><?xml version="1.0" encoding="utf-8"?>
+<p:sld xmlns:a="http://schemas.openxmlformats.org/drawingml/2006/main" xmlns:r="http://schemas.openxmlformats.org/officeDocument/2006/relationships" xmlns:p="http://schemas.openxmlformats.org/presentationml/2006/main">
+  <p:cSld>
+    <p:spTree>
+      <p:nvGrpSpPr>
+        <p:cNvPr id="1" name=""/>
+        <p:cNvGrpSpPr/>
+        <p:nvPr/>
+      </p:nvGrpSpPr>
+      <p:grpSpPr>
+        <a:xfrm>
+          <a:off x="0" y="0"/>
+          <a:ext cx="0" cy="0"/>
+          <a:chOff x="0" y="0"/>
+          <a:chExt cx="0" cy="0"/>
+        </a:xfrm>
+      </p:grpSpPr>
+      <p:sp>
+        <p:nvSpPr>
+          <p:cNvPr id="2" name="内容占位符 1"/>
+          <p:cNvSpPr>
+            <a:spLocks noGrp="1"/>
+          </p:cNvSpPr>
+          <p:nvPr>
+            <p:ph sz="half" idx="2"/>
+          </p:nvPr>
+        </p:nvSpPr>
+        <p:spPr/>
+        <p:txBody>
+          <a:bodyPr/>
+          <a:lstStyle/>
+          <a:p>
+            <a:endParaRPr lang="zh-CN" altLang="en-US"/>
+          </a:p>
+        </p:txBody>
+      </p:sp>
+      <p:sp>
+        <p:nvSpPr>
+          <p:cNvPr id="3" name="标题 2"/>
+          <p:cNvSpPr>
+            <a:spLocks noGrp="1"/>
+          </p:cNvSpPr>
+          <p:nvPr>
+            <p:ph type="title"/>
+          </p:nvPr>
+        </p:nvSpPr>
+        <p:spPr/>
+        <p:txBody>
+          <a:bodyPr/>
+          <a:lstStyle/>
+          <a:p>
+            <a:r>
+              <a:rPr lang="en-US" altLang="zh-CN" dirty="0"/>
+              <a:t>Matplotlib</a:t>
+            </a:r>
+            <a:endParaRPr lang="zh-CN" altLang="en-US" dirty="0"/>
+          </a:p>
+        </p:txBody>
+      </p:sp>
+      <p:sp>
+        <p:nvSpPr>
+          <p:cNvPr id="4" name="矩形 3"/>
+          <p:cNvSpPr/>
+          <p:nvPr/>
+        </p:nvSpPr>
+        <p:spPr>
+          <a:xfrm>
+            <a:off x="443512" y="1233320"/>
+            <a:ext cx="5842992" cy="2031325"/>
+          </a:xfrm>
+          <a:prstGeom prst="rect">
+            <a:avLst/>
+          </a:prstGeom>
+        </p:spPr>
+        <p:txBody>
+          <a:bodyPr wrap="square">
+            <a:spAutoFit/>
+          </a:bodyPr>
+          <a:lstStyle/>
+          <a:p>
+            <a:r>
+              <a:rPr lang="zh-CN" altLang="en-US" dirty="0"/>
+              <a:t>plt.ylim(0, 1.2)</a:t>
+            </a:r>
+          </a:p>
+          <a:p>
+            <a:r>
+              <a:rPr lang="zh-CN" altLang="en-US" dirty="0"/>
+              <a:t>plt.xlim(-0.2, 4.0)</a:t>
+            </a:r>
+          </a:p>
+          <a:p>
+            <a:r>
+              <a:rPr lang="zh-CN" altLang="en-US" dirty="0"/>
+              <a:t>plt.legend(prop={'size': 13, 'family' : 'Times New Roman'})  </a:t>
+            </a:r>
+          </a:p>
+          <a:p>
+            <a:r>
+              <a:rPr lang="zh-CN" altLang="en-US" dirty="0"/>
+              <a:t>  </a:t>
+            </a:r>
+          </a:p>
+          <a:p>
+            <a:r>
+              <a:rPr lang="zh-CN" altLang="en-US" dirty="0"/>
+              <a:t>plt.tight_layout()</a:t>
+            </a:r>
+          </a:p>
+          <a:p>
+            <a:r>
+              <a:rPr lang="zh-CN" altLang="en-US" dirty="0"/>
+              <a:t>plt.grid(True)</a:t>
+            </a:r>
+          </a:p>
+          <a:p>
+            <a:r>
+              <a:rPr lang="zh-CN" altLang="en-US" dirty="0"/>
+              <a:t>plt.show() </a:t>
+            </a:r>
+          </a:p>
+        </p:txBody>
+      </p:sp>
+      <p:pic>
+        <p:nvPicPr>
+          <p:cNvPr id="5" name="图片 4"/>
+          <p:cNvPicPr>
+            <a:picLocks noChangeAspect="1"/>
+          </p:cNvPicPr>
+          <p:nvPr/>
+        </p:nvPicPr>
+        <p:blipFill>
+          <a:blip r:embed="rId2"/>
+          <a:stretch>
+            <a:fillRect/>
+          </a:stretch>
+        </p:blipFill>
+        <p:spPr>
+          <a:xfrm>
+            <a:off x="3203848" y="2492896"/>
+            <a:ext cx="4255170" cy="3837607"/>
+          </a:xfrm>
+          <a:prstGeom prst="rect">
+            <a:avLst/>
+          </a:prstGeom>
+        </p:spPr>
+      </p:pic>
+    </p:spTree>
+    <p:extLst>
+      <p:ext uri="{BB962C8B-B14F-4D97-AF65-F5344CB8AC3E}">
+        <p14:creationId xmlns:p14="http://schemas.microsoft.com/office/powerpoint/2010/main" val="2621741419"/>
+      </p:ext>
+    </p:extLst>
+  </p:cSld>
+  <p:clrMapOvr>
+    <a:masterClrMapping/>
+  </p:clrMapOvr>
+</p:sld>
+</file>
+
+<file path=ppt/slides/slide35.xml><?xml version="1.0" encoding="utf-8"?>
+<p:sld xmlns:a="http://schemas.openxmlformats.org/drawingml/2006/main" xmlns:r="http://schemas.openxmlformats.org/officeDocument/2006/relationships" xmlns:p="http://schemas.openxmlformats.org/presentationml/2006/main">
+  <p:cSld>
+    <p:spTree>
+      <p:nvGrpSpPr>
+        <p:cNvPr id="1" name=""/>
+        <p:cNvGrpSpPr/>
+        <p:nvPr/>
+      </p:nvGrpSpPr>
+      <p:grpSpPr>
+        <a:xfrm>
+          <a:off x="0" y="0"/>
+          <a:ext cx="0" cy="0"/>
+          <a:chOff x="0" y="0"/>
+          <a:chExt cx="0" cy="0"/>
+        </a:xfrm>
+      </p:grpSpPr>
+      <p:sp>
+        <p:nvSpPr>
+          <p:cNvPr id="2" name="内容占位符 1"/>
+          <p:cNvSpPr>
+            <a:spLocks noGrp="1"/>
+          </p:cNvSpPr>
+          <p:nvPr>
+            <p:ph sz="half" idx="2"/>
+          </p:nvPr>
+        </p:nvSpPr>
+        <p:spPr/>
+        <p:txBody>
+          <a:bodyPr/>
+          <a:lstStyle/>
+          <a:p>
+            <a:pPr marL="342900" indent="-342900">
+              <a:buFont typeface="Wingdings" panose="05000000000000000000" pitchFamily="2" charset="2"/>
+              <a:buChar char="l"/>
+            </a:pPr>
+            <a:r>
+              <a:rPr lang="en-US" altLang="zh-CN" dirty="0"/>
+              <a:t>Advanced example - </a:t>
+            </a:r>
+            <a:r>
+              <a:rPr lang="en-US" altLang="zh-CN" dirty="0" smtClean="0"/>
+              <a:t>line</a:t>
+            </a:r>
+            <a:endParaRPr lang="zh-CN" altLang="en-US" dirty="0"/>
+          </a:p>
+          <a:p>
+            <a:endParaRPr lang="zh-CN" altLang="en-US" dirty="0"/>
+          </a:p>
+        </p:txBody>
+      </p:sp>
+      <p:sp>
+        <p:nvSpPr>
+          <p:cNvPr id="3" name="标题 2"/>
+          <p:cNvSpPr>
+            <a:spLocks noGrp="1"/>
+          </p:cNvSpPr>
+          <p:nvPr>
+            <p:ph type="title"/>
+          </p:nvPr>
+        </p:nvSpPr>
+        <p:spPr/>
+        <p:txBody>
+          <a:bodyPr/>
+          <a:lstStyle/>
+          <a:p>
+            <a:r>
+              <a:rPr lang="en-US" altLang="zh-CN" dirty="0"/>
+              <a:t>Matplotlib</a:t>
+            </a:r>
+            <a:endParaRPr lang="zh-CN" altLang="en-US" dirty="0"/>
+          </a:p>
+        </p:txBody>
+      </p:sp>
+      <p:sp>
+        <p:nvSpPr>
+          <p:cNvPr id="6" name="矩形 5"/>
+          <p:cNvSpPr/>
+          <p:nvPr/>
+        </p:nvSpPr>
+        <p:spPr>
+          <a:xfrm>
+            <a:off x="899592" y="1676857"/>
+            <a:ext cx="7344816" cy="4801314"/>
+          </a:xfrm>
+          <a:prstGeom prst="rect">
+            <a:avLst/>
+          </a:prstGeom>
+        </p:spPr>
+        <p:txBody>
+          <a:bodyPr wrap="square">
+            <a:spAutoFit/>
+          </a:bodyPr>
+          <a:lstStyle/>
+          <a:p>
+            <a:r>
+              <a:rPr lang="zh-CN" altLang="en-US" dirty="0"/>
+              <a:t>from __future__ import absolute_import</a:t>
+            </a:r>
+          </a:p>
+          <a:p>
+            <a:r>
+              <a:rPr lang="zh-CN" altLang="en-US" dirty="0"/>
+              <a:t>from __future__ import print_function</a:t>
+            </a:r>
+          </a:p>
+          <a:p>
+            <a:endParaRPr lang="zh-CN" altLang="en-US" dirty="0"/>
+          </a:p>
+          <a:p>
+            <a:r>
+              <a:rPr lang="zh-CN" altLang="en-US" dirty="0"/>
+              <a:t>import os</a:t>
+            </a:r>
+          </a:p>
+          <a:p>
+            <a:r>
+              <a:rPr lang="zh-CN" altLang="en-US" dirty="0"/>
+              <a:t>import sys</a:t>
+            </a:r>
+          </a:p>
+          <a:p>
+            <a:r>
+              <a:rPr lang="zh-CN" altLang="en-US" dirty="0"/>
+              <a:t>import logging</a:t>
+            </a:r>
+          </a:p>
+          <a:p>
+            <a:endParaRPr lang="zh-CN" altLang="en-US" dirty="0"/>
+          </a:p>
+          <a:p>
+            <a:r>
+              <a:rPr lang="zh-CN" altLang="en-US" dirty="0"/>
+              <a:t>from matplotlib import pyplot as plt</a:t>
+            </a:r>
+          </a:p>
+          <a:p>
+            <a:endParaRPr lang="zh-CN" altLang="en-US" dirty="0"/>
+          </a:p>
+          <a:p>
+            <a:r>
+              <a:rPr lang="zh-CN" altLang="en-US" dirty="0"/>
+              <a:t>x_topn = [1, 2, 3, 4, 5]</a:t>
+            </a:r>
+          </a:p>
+          <a:p>
+            <a:r>
+              <a:rPr lang="zh-CN" altLang="en-US" dirty="0"/>
+              <a:t>y_binary = [ 88.8, 89, 88.1, 87.2, 86.2]</a:t>
+            </a:r>
+          </a:p>
+          <a:p>
+            <a:r>
+              <a:rPr lang="zh-CN" altLang="en-US" dirty="0"/>
+              <a:t>y_finegrained = [64.8, 65.8, 64.5, 61.2, 58.8]</a:t>
+            </a:r>
+          </a:p>
+          <a:p>
+            <a:endParaRPr lang="zh-CN" altLang="en-US" dirty="0"/>
+          </a:p>
+          <a:p>
+            <a:r>
+              <a:rPr lang="zh-CN" altLang="en-US" dirty="0"/>
+              <a:t>font = {'family' : 'Times New Roman', 'color'  : 'black',\</a:t>
+            </a:r>
+          </a:p>
+          <a:p>
+            <a:r>
+              <a:rPr lang="zh-CN" altLang="en-US" dirty="0"/>
+              <a:t>         'weight' : 'normal', 'size' : 20}</a:t>
+            </a:r>
+          </a:p>
+          <a:p>
+            <a:endParaRPr lang="zh-CN" altLang="en-US" dirty="0"/>
+          </a:p>
+          <a:p>
+            <a:r>
+              <a:rPr lang="zh-CN" altLang="en-US" dirty="0"/>
+              <a:t>fig = plt.figure()</a:t>
+            </a:r>
+          </a:p>
+        </p:txBody>
+      </p:sp>
+    </p:spTree>
+    <p:extLst>
+      <p:ext uri="{BB962C8B-B14F-4D97-AF65-F5344CB8AC3E}">
+        <p14:creationId xmlns:p14="http://schemas.microsoft.com/office/powerpoint/2010/main" val="3908822589"/>
+      </p:ext>
+    </p:extLst>
+  </p:cSld>
+  <p:clrMapOvr>
+    <a:masterClrMapping/>
+  </p:clrMapOvr>
+</p:sld>
+</file>
+
+<file path=ppt/slides/slide36.xml><?xml version="1.0" encoding="utf-8"?>
+<p:sld xmlns:a="http://schemas.openxmlformats.org/drawingml/2006/main" xmlns:r="http://schemas.openxmlformats.org/officeDocument/2006/relationships" xmlns:p="http://schemas.openxmlformats.org/presentationml/2006/main">
+  <p:cSld>
+    <p:spTree>
+      <p:nvGrpSpPr>
+        <p:cNvPr id="1" name=""/>
+        <p:cNvGrpSpPr/>
+        <p:nvPr/>
+      </p:nvGrpSpPr>
+      <p:grpSpPr>
+        <a:xfrm>
+          <a:off x="0" y="0"/>
+          <a:ext cx="0" cy="0"/>
+          <a:chOff x="0" y="0"/>
+          <a:chExt cx="0" cy="0"/>
+        </a:xfrm>
+      </p:grpSpPr>
+      <p:sp>
+        <p:nvSpPr>
+          <p:cNvPr id="2" name="内容占位符 1"/>
+          <p:cNvSpPr>
+            <a:spLocks noGrp="1"/>
+          </p:cNvSpPr>
+          <p:nvPr>
+            <p:ph sz="half" idx="2"/>
+          </p:nvPr>
+        </p:nvSpPr>
+        <p:spPr/>
+        <p:txBody>
+          <a:bodyPr/>
+          <a:lstStyle/>
+          <a:p>
+            <a:pPr marL="342900" indent="-342900">
+              <a:buFont typeface="Wingdings" panose="05000000000000000000" pitchFamily="2" charset="2"/>
+              <a:buChar char="l"/>
+            </a:pPr>
+            <a:r>
+              <a:rPr lang="en-US" altLang="zh-CN" dirty="0" smtClean="0"/>
+              <a:t>Twin - x</a:t>
+            </a:r>
+            <a:endParaRPr lang="zh-CN" altLang="en-US" dirty="0"/>
+          </a:p>
+        </p:txBody>
+      </p:sp>
+      <p:sp>
+        <p:nvSpPr>
+          <p:cNvPr id="3" name="标题 2"/>
+          <p:cNvSpPr>
+            <a:spLocks noGrp="1"/>
+          </p:cNvSpPr>
+          <p:nvPr>
+            <p:ph type="title"/>
+          </p:nvPr>
+        </p:nvSpPr>
+        <p:spPr/>
+        <p:txBody>
+          <a:bodyPr/>
+          <a:lstStyle/>
+          <a:p>
+            <a:r>
+              <a:rPr lang="en-US" altLang="zh-CN" dirty="0"/>
+              <a:t>Matplotlib</a:t>
+            </a:r>
+            <a:endParaRPr lang="zh-CN" altLang="en-US" dirty="0"/>
+          </a:p>
+        </p:txBody>
+      </p:sp>
+      <p:sp>
+        <p:nvSpPr>
+          <p:cNvPr id="4" name="矩形 3"/>
+          <p:cNvSpPr/>
+          <p:nvPr/>
+        </p:nvSpPr>
+        <p:spPr>
+          <a:xfrm>
+            <a:off x="621904" y="1699769"/>
+            <a:ext cx="8064896" cy="4801314"/>
+          </a:xfrm>
+          <a:prstGeom prst="rect">
+            <a:avLst/>
+          </a:prstGeom>
+        </p:spPr>
+        <p:txBody>
+          <a:bodyPr wrap="square">
+            <a:spAutoFit/>
+          </a:bodyPr>
+          <a:lstStyle/>
+          <a:p>
+            <a:r>
+              <a:rPr lang="zh-CN" altLang="en-US" dirty="0"/>
+              <a:t>ax1 = fig.add_subplot(111)</a:t>
+            </a:r>
+          </a:p>
+          <a:p>
+            <a:r>
+              <a:rPr lang="zh-CN" altLang="en-US" dirty="0"/>
+              <a:t>line1, = ax1.plot(x_topn, y_binary, 'rs-', linewidth=2.2, label='Binary')</a:t>
+            </a:r>
+          </a:p>
+          <a:p>
+            <a:r>
+              <a:rPr lang="zh-CN" altLang="en-US" dirty="0"/>
+              <a:t>ax1.set_xlim(0.75, 5.25)</a:t>
+            </a:r>
+          </a:p>
+          <a:p>
+            <a:r>
+              <a:rPr lang="zh-CN" altLang="en-US" dirty="0"/>
+              <a:t>ax1.set_ylim(85.5, 90.5)</a:t>
+            </a:r>
+          </a:p>
+          <a:p>
+            <a:r>
+              <a:rPr lang="zh-CN" altLang="en-US" dirty="0"/>
+              <a:t>ax1.set_ylabel('Binary (Macro-F1)', fontdict=font)</a:t>
+            </a:r>
+          </a:p>
+          <a:p>
+            <a:r>
+              <a:rPr lang="zh-CN" altLang="en-US" dirty="0"/>
+              <a:t>ax1.set_xlabel('$\\alpha:\\beta$', fontdict=font)</a:t>
+            </a:r>
+          </a:p>
+          <a:p>
+            <a:r>
+              <a:rPr lang="zh-CN" altLang="en-US" dirty="0"/>
+              <a:t>ax1.tick_params(labelsize=16)</a:t>
+            </a:r>
+          </a:p>
+          <a:p>
+            <a:r>
+              <a:rPr lang="zh-CN" altLang="en-US" dirty="0"/>
+              <a:t>ax1.set_yticklabels(('', '86.0', '87.0', '88.0', '89.0', '90.0</a:t>
+            </a:r>
+            <a:r>
+              <a:rPr lang="zh-CN" altLang="en-US" dirty="0" smtClean="0"/>
+              <a:t>'))</a:t>
+            </a:r>
+            <a:endParaRPr lang="en-US" altLang="zh-CN" dirty="0" smtClean="0"/>
+          </a:p>
+          <a:p>
+            <a:endParaRPr lang="en-US" altLang="zh-CN" dirty="0"/>
+          </a:p>
+          <a:p>
+            <a:r>
+              <a:rPr lang="zh-CN" altLang="en-US" dirty="0"/>
+              <a:t>ax2 = ax1.twinx()</a:t>
+            </a:r>
+          </a:p>
+          <a:p>
+            <a:r>
+              <a:rPr lang="zh-CN" altLang="en-US" dirty="0"/>
+              <a:t>line2, = ax2.plot(x_topn, y_finegrained, 'bh-', linewidth=2.2, label='Ternary')</a:t>
+            </a:r>
+          </a:p>
+          <a:p>
+            <a:r>
+              <a:rPr lang="zh-CN" altLang="en-US" dirty="0"/>
+              <a:t>ax2.set_xlim(0.75, 5.25)</a:t>
+            </a:r>
+          </a:p>
+          <a:p>
+            <a:r>
+              <a:rPr lang="zh-CN" altLang="en-US" dirty="0"/>
+              <a:t>ax2.set_ylim(56.5, 68.5)</a:t>
+            </a:r>
+          </a:p>
+          <a:p>
+            <a:r>
+              <a:rPr lang="zh-CN" altLang="en-US" dirty="0"/>
+              <a:t>ax2.set_ylabel('Ternary (Macro-F1)', fontdict=font)</a:t>
+            </a:r>
+          </a:p>
+          <a:p>
+            <a:r>
+              <a:rPr lang="zh-CN" altLang="en-US" dirty="0"/>
+              <a:t>ax2.tick_params(labelsize=16)</a:t>
+            </a:r>
+          </a:p>
+          <a:p>
+            <a:r>
+              <a:rPr lang="zh-CN" altLang="en-US" dirty="0"/>
+              <a:t>ax2.set_yticklabels(('', '58.0', '60.0', '62.0', '64.0', '66.0', '68.0'))</a:t>
+            </a:r>
+          </a:p>
+          <a:p>
+            <a:endParaRPr lang="zh-CN" altLang="en-US" dirty="0"/>
+          </a:p>
+        </p:txBody>
+      </p:sp>
+    </p:spTree>
+    <p:extLst>
+      <p:ext uri="{BB962C8B-B14F-4D97-AF65-F5344CB8AC3E}">
+        <p14:creationId xmlns:p14="http://schemas.microsoft.com/office/powerpoint/2010/main" val="204816848"/>
+      </p:ext>
+    </p:extLst>
+  </p:cSld>
+  <p:clrMapOvr>
+    <a:masterClrMapping/>
+  </p:clrMapOvr>
+</p:sld>
+</file>
+
+<file path=ppt/slides/slide37.xml><?xml version="1.0" encoding="utf-8"?>
+<p:sld xmlns:a="http://schemas.openxmlformats.org/drawingml/2006/main" xmlns:r="http://schemas.openxmlformats.org/officeDocument/2006/relationships" xmlns:p="http://schemas.openxmlformats.org/presentationml/2006/main">
+  <p:cSld>
+    <p:spTree>
+      <p:nvGrpSpPr>
+        <p:cNvPr id="1" name=""/>
+        <p:cNvGrpSpPr/>
+        <p:nvPr/>
+      </p:nvGrpSpPr>
+      <p:grpSpPr>
+        <a:xfrm>
+          <a:off x="0" y="0"/>
+          <a:ext cx="0" cy="0"/>
+          <a:chOff x="0" y="0"/>
+          <a:chExt cx="0" cy="0"/>
+        </a:xfrm>
+      </p:grpSpPr>
+      <p:sp>
+        <p:nvSpPr>
+          <p:cNvPr id="2" name="内容占位符 1"/>
+          <p:cNvSpPr>
+            <a:spLocks noGrp="1"/>
+          </p:cNvSpPr>
+          <p:nvPr>
+            <p:ph sz="half" idx="2"/>
+          </p:nvPr>
+        </p:nvSpPr>
+        <p:spPr/>
+        <p:txBody>
+          <a:bodyPr/>
+          <a:lstStyle/>
+          <a:p>
+            <a:pPr marL="342900" indent="-342900">
+              <a:buFont typeface="Wingdings" panose="05000000000000000000" pitchFamily="2" charset="2"/>
+              <a:buChar char="l"/>
+            </a:pPr>
+            <a:r>
+              <a:rPr lang="en-US" altLang="zh-CN" dirty="0" smtClean="0"/>
+              <a:t>Twin - x</a:t>
+            </a:r>
+            <a:endParaRPr lang="zh-CN" altLang="en-US" dirty="0"/>
+          </a:p>
+        </p:txBody>
+      </p:sp>
+      <p:sp>
+        <p:nvSpPr>
+          <p:cNvPr id="3" name="标题 2"/>
+          <p:cNvSpPr>
+            <a:spLocks noGrp="1"/>
+          </p:cNvSpPr>
+          <p:nvPr>
+            <p:ph type="title"/>
+          </p:nvPr>
+        </p:nvSpPr>
+        <p:spPr/>
+        <p:txBody>
+          <a:bodyPr/>
+          <a:lstStyle/>
+          <a:p>
+            <a:r>
+              <a:rPr lang="en-US" altLang="zh-CN" dirty="0"/>
+              <a:t>Matplotlib</a:t>
+            </a:r>
+            <a:endParaRPr lang="zh-CN" altLang="en-US" dirty="0"/>
+          </a:p>
+        </p:txBody>
+      </p:sp>
+      <p:sp>
+        <p:nvSpPr>
+          <p:cNvPr id="5" name="矩形 4"/>
+          <p:cNvSpPr/>
+          <p:nvPr/>
+        </p:nvSpPr>
+        <p:spPr>
+          <a:xfrm>
+            <a:off x="457200" y="1997839"/>
+            <a:ext cx="8507288" cy="2308324"/>
+          </a:xfrm>
+          <a:prstGeom prst="rect">
+            <a:avLst/>
+          </a:prstGeom>
+        </p:spPr>
+        <p:txBody>
+          <a:bodyPr wrap="square">
+            <a:spAutoFit/>
+          </a:bodyPr>
+          <a:lstStyle/>
+          <a:p>
+            <a:r>
+              <a:rPr lang="zh-CN" altLang="en-US" dirty="0"/>
+              <a:t>plt.legend(handles=[line1, line2], prop={'size': 18, 'family' : 'Times New Roman'}, loc='upper right')</a:t>
+            </a:r>
+          </a:p>
+          <a:p>
+            <a:endParaRPr lang="zh-CN" altLang="en-US" dirty="0"/>
+          </a:p>
+          <a:p>
+            <a:r>
+              <a:rPr lang="zh-CN" altLang="en-US" dirty="0"/>
+              <a:t>plt.gca().set_xticklabels(('',  '0.01', '0.03', '0.1', '0.3', '1.0'))</a:t>
+            </a:r>
+          </a:p>
+          <a:p>
+            <a:endParaRPr lang="zh-CN" altLang="en-US" dirty="0"/>
+          </a:p>
+          <a:p>
+            <a:r>
+              <a:rPr lang="zh-CN" altLang="en-US" dirty="0"/>
+              <a:t>plt.tight_layout()</a:t>
+            </a:r>
+          </a:p>
+          <a:p>
+            <a:r>
+              <a:rPr lang="zh-CN" altLang="en-US" dirty="0"/>
+              <a:t>plt.grid()</a:t>
+            </a:r>
+          </a:p>
+          <a:p>
+            <a:r>
+              <a:rPr lang="zh-CN" altLang="en-US" dirty="0"/>
+              <a:t>plt.show()</a:t>
+            </a:r>
+          </a:p>
+        </p:txBody>
+      </p:sp>
+      <p:pic>
+        <p:nvPicPr>
+          <p:cNvPr id="6" name="图片 5"/>
+          <p:cNvPicPr>
+            <a:picLocks noChangeAspect="1"/>
+          </p:cNvPicPr>
+          <p:nvPr/>
+        </p:nvPicPr>
+        <p:blipFill>
+          <a:blip r:embed="rId2"/>
+          <a:stretch>
+            <a:fillRect/>
+          </a:stretch>
+        </p:blipFill>
+        <p:spPr>
+          <a:xfrm>
+            <a:off x="3419872" y="3552676"/>
+            <a:ext cx="3528392" cy="3182148"/>
+          </a:xfrm>
+          <a:prstGeom prst="rect">
+            <a:avLst/>
+          </a:prstGeom>
+        </p:spPr>
+      </p:pic>
+    </p:spTree>
+    <p:extLst>
+      <p:ext uri="{BB962C8B-B14F-4D97-AF65-F5344CB8AC3E}">
+        <p14:creationId xmlns:p14="http://schemas.microsoft.com/office/powerpoint/2010/main" val="1568721393"/>
+      </p:ext>
+    </p:extLst>
+  </p:cSld>
+  <p:clrMapOvr>
+    <a:masterClrMapping/>
+  </p:clrMapOvr>
+</p:sld>
+</file>
+
+<file path=ppt/slides/slide38.xml><?xml version="1.0" encoding="utf-8"?>
 <p:sld xmlns:a="http://schemas.openxmlformats.org/drawingml/2006/main" xmlns:r="http://schemas.openxmlformats.org/officeDocument/2006/relationships" xmlns:p="http://schemas.openxmlformats.org/presentationml/2006/main">
   <p:cSld>
     <p:spTree>
@@ -10666,7 +13135,7 @@
 </p:sld>
 </file>
 
-<file path=ppt/slides/slide28.xml><?xml version="1.0" encoding="utf-8"?>
+<file path=ppt/slides/slide39.xml><?xml version="1.0" encoding="utf-8"?>
 <p:sld xmlns:a="http://schemas.openxmlformats.org/drawingml/2006/main" xmlns:r="http://schemas.openxmlformats.org/officeDocument/2006/relationships" xmlns:p="http://schemas.openxmlformats.org/presentationml/2006/main">
   <p:cSld>
     <p:spTree>
@@ -10792,7 +13261,7 @@
 </p:sld>
 </file>
 
-<file path=ppt/slides/slide29.xml><?xml version="1.0" encoding="utf-8"?>
+<file path=ppt/slides/slide4.xml><?xml version="1.0" encoding="utf-8"?>
 <p:sld xmlns:a="http://schemas.openxmlformats.org/drawingml/2006/main" xmlns:r="http://schemas.openxmlformats.org/officeDocument/2006/relationships" xmlns:p="http://schemas.openxmlformats.org/presentationml/2006/main">
   <p:cSld>
     <p:spTree>
@@ -10830,6 +13299,427 @@
             </a:pPr>
             <a:r>
               <a:rPr lang="en-US" altLang="zh-CN" dirty="0" smtClean="0"/>
+              <a:t>CTEX is the best solution for using both English and Chinese.</a:t>
+            </a:r>
+          </a:p>
+          <a:p>
+            <a:pPr marL="342900" indent="-342900">
+              <a:buFont typeface="Wingdings" panose="05000000000000000000" pitchFamily="2" charset="2"/>
+              <a:buChar char="l"/>
+            </a:pPr>
+            <a:r>
+              <a:rPr lang="en-US" altLang="zh-CN" dirty="0">
+                <a:hlinkClick r:id="rId2"/>
+              </a:rPr>
+              <a:t>http://</a:t>
+            </a:r>
+            <a:r>
+              <a:rPr lang="en-US" altLang="zh-CN" dirty="0" smtClean="0">
+                <a:hlinkClick r:id="rId2"/>
+              </a:rPr>
+              <a:t>www.ctex.org/HomePage</a:t>
+            </a:r>
+            <a:endParaRPr lang="en-US" altLang="zh-CN" dirty="0" smtClean="0"/>
+          </a:p>
+          <a:p>
+            <a:pPr marL="342900" indent="-342900">
+              <a:buFont typeface="Wingdings" panose="05000000000000000000" pitchFamily="2" charset="2"/>
+              <a:buChar char="l"/>
+            </a:pPr>
+            <a:endParaRPr lang="en-US" altLang="zh-CN" dirty="0"/>
+          </a:p>
+          <a:p>
+            <a:pPr marL="342900" indent="-342900">
+              <a:buFont typeface="Wingdings" panose="05000000000000000000" pitchFamily="2" charset="2"/>
+              <a:buChar char="l"/>
+            </a:pPr>
+            <a:r>
+              <a:rPr lang="en-US" altLang="zh-CN" dirty="0" smtClean="0"/>
+              <a:t>Before installation, you should backup your system PATH environment variable</a:t>
+            </a:r>
+          </a:p>
+          <a:p>
+            <a:pPr marL="342900" indent="-342900">
+              <a:buFont typeface="Wingdings" panose="05000000000000000000" pitchFamily="2" charset="2"/>
+              <a:buChar char="l"/>
+            </a:pPr>
+            <a:endParaRPr lang="en-US" altLang="zh-CN" dirty="0"/>
+          </a:p>
+          <a:p>
+            <a:pPr marL="342900" indent="-342900">
+              <a:buFont typeface="Wingdings" panose="05000000000000000000" pitchFamily="2" charset="2"/>
+              <a:buChar char="l"/>
+            </a:pPr>
+            <a:r>
+              <a:rPr lang="zh-CN" altLang="en-US" dirty="0" smtClean="0"/>
+              <a:t>右键</a:t>
+            </a:r>
+            <a:r>
+              <a:rPr lang="en-US" altLang="zh-CN" dirty="0" smtClean="0"/>
+              <a:t>“</a:t>
+            </a:r>
+            <a:r>
+              <a:rPr lang="zh-CN" altLang="en-US" dirty="0" smtClean="0"/>
+              <a:t>我的电脑</a:t>
+            </a:r>
+            <a:r>
+              <a:rPr lang="en-US" altLang="zh-CN" dirty="0" smtClean="0"/>
+              <a:t>”-&gt;</a:t>
+            </a:r>
+            <a:r>
+              <a:rPr lang="zh-CN" altLang="en-US" dirty="0" smtClean="0"/>
+              <a:t>点击</a:t>
+            </a:r>
+            <a:r>
+              <a:rPr lang="en-US" altLang="zh-CN" dirty="0" smtClean="0"/>
+              <a:t>“</a:t>
+            </a:r>
+            <a:r>
+              <a:rPr lang="zh-CN" altLang="en-US" dirty="0"/>
+              <a:t>属性</a:t>
+            </a:r>
+            <a:r>
+              <a:rPr lang="en-US" altLang="zh-CN" dirty="0" smtClean="0"/>
+              <a:t>”-&gt;</a:t>
+            </a:r>
+            <a:r>
+              <a:rPr lang="zh-CN" altLang="en-US" dirty="0" smtClean="0"/>
+              <a:t>点击</a:t>
+            </a:r>
+            <a:r>
+              <a:rPr lang="en-US" altLang="zh-CN" dirty="0" smtClean="0"/>
+              <a:t>“</a:t>
+            </a:r>
+            <a:r>
+              <a:rPr lang="zh-CN" altLang="en-US" dirty="0" smtClean="0"/>
+              <a:t>高级系统设置</a:t>
+            </a:r>
+            <a:r>
+              <a:rPr lang="en-US" altLang="zh-CN" dirty="0" smtClean="0"/>
+              <a:t>”-&gt;</a:t>
+            </a:r>
+            <a:r>
+              <a:rPr lang="zh-CN" altLang="en-US" dirty="0" smtClean="0"/>
+              <a:t>点击</a:t>
+            </a:r>
+            <a:r>
+              <a:rPr lang="en-US" altLang="zh-CN" dirty="0" smtClean="0"/>
+              <a:t>“</a:t>
+            </a:r>
+            <a:r>
+              <a:rPr lang="zh-CN" altLang="en-US" dirty="0" smtClean="0"/>
+              <a:t>环境变量</a:t>
+            </a:r>
+            <a:r>
+              <a:rPr lang="en-US" altLang="zh-CN" dirty="0" smtClean="0"/>
+              <a:t>”-&gt;</a:t>
+            </a:r>
+            <a:r>
+              <a:rPr lang="zh-CN" altLang="en-US" dirty="0" smtClean="0"/>
+              <a:t>在系统变量中找到</a:t>
+            </a:r>
+            <a:r>
+              <a:rPr lang="en-US" altLang="zh-CN" dirty="0" smtClean="0"/>
+              <a:t>“PATH”-&gt;</a:t>
+            </a:r>
+            <a:r>
+              <a:rPr lang="zh-CN" altLang="en-US" dirty="0" smtClean="0"/>
+              <a:t>全选后复制粘贴到一个新建文本中。</a:t>
+            </a:r>
+            <a:endParaRPr lang="en-US" altLang="zh-CN" dirty="0" smtClean="0"/>
+          </a:p>
+          <a:p>
+            <a:pPr marL="342900" indent="-342900">
+              <a:buFont typeface="Wingdings" panose="05000000000000000000" pitchFamily="2" charset="2"/>
+              <a:buChar char="l"/>
+            </a:pPr>
+            <a:endParaRPr lang="zh-CN" altLang="en-US" dirty="0"/>
+          </a:p>
+        </p:txBody>
+      </p:sp>
+      <p:sp>
+        <p:nvSpPr>
+          <p:cNvPr id="3" name="标题 2"/>
+          <p:cNvSpPr>
+            <a:spLocks noGrp="1"/>
+          </p:cNvSpPr>
+          <p:nvPr>
+            <p:ph type="title"/>
+          </p:nvPr>
+        </p:nvSpPr>
+        <p:spPr/>
+        <p:txBody>
+          <a:bodyPr/>
+          <a:lstStyle/>
+          <a:p>
+            <a:r>
+              <a:rPr lang="en-US" altLang="zh-CN" dirty="0"/>
+              <a:t>Set up for </a:t>
+            </a:r>
+            <a:r>
+              <a:rPr lang="en-US" altLang="zh-CN" dirty="0" err="1"/>
+              <a:t>LaTeX</a:t>
+            </a:r>
+            <a:endParaRPr lang="zh-CN" altLang="en-US" dirty="0"/>
+          </a:p>
+        </p:txBody>
+      </p:sp>
+    </p:spTree>
+    <p:extLst>
+      <p:ext uri="{BB962C8B-B14F-4D97-AF65-F5344CB8AC3E}">
+        <p14:creationId xmlns:p14="http://schemas.microsoft.com/office/powerpoint/2010/main" val="3494694920"/>
+      </p:ext>
+    </p:extLst>
+  </p:cSld>
+  <p:clrMapOvr>
+    <a:masterClrMapping/>
+  </p:clrMapOvr>
+</p:sld>
+</file>
+
+<file path=ppt/slides/slide40.xml><?xml version="1.0" encoding="utf-8"?>
+<p:sld xmlns:a="http://schemas.openxmlformats.org/drawingml/2006/main" xmlns:r="http://schemas.openxmlformats.org/officeDocument/2006/relationships" xmlns:p="http://schemas.openxmlformats.org/presentationml/2006/main">
+  <p:cSld>
+    <p:spTree>
+      <p:nvGrpSpPr>
+        <p:cNvPr id="1" name=""/>
+        <p:cNvGrpSpPr/>
+        <p:nvPr/>
+      </p:nvGrpSpPr>
+      <p:grpSpPr>
+        <a:xfrm>
+          <a:off x="0" y="0"/>
+          <a:ext cx="0" cy="0"/>
+          <a:chOff x="0" y="0"/>
+          <a:chExt cx="0" cy="0"/>
+        </a:xfrm>
+      </p:grpSpPr>
+      <p:sp>
+        <p:nvSpPr>
+          <p:cNvPr id="2" name="内容占位符 1"/>
+          <p:cNvSpPr>
+            <a:spLocks noGrp="1"/>
+          </p:cNvSpPr>
+          <p:nvPr>
+            <p:ph sz="half" idx="2"/>
+          </p:nvPr>
+        </p:nvSpPr>
+        <p:spPr/>
+        <p:txBody>
+          <a:bodyPr/>
+          <a:lstStyle/>
+          <a:p>
+            <a:pPr marL="342900" indent="-342900">
+              <a:buFont typeface="Wingdings" panose="05000000000000000000" pitchFamily="2" charset="2"/>
+              <a:buChar char="l"/>
+            </a:pPr>
+            <a:r>
+              <a:rPr lang="en-US" altLang="zh-CN" dirty="0" smtClean="0"/>
+              <a:t>Type</a:t>
+            </a:r>
+          </a:p>
+          <a:p>
+            <a:pPr marL="342900" indent="-342900">
+              <a:buFont typeface="Wingdings" panose="05000000000000000000" pitchFamily="2" charset="2"/>
+              <a:buChar char="l"/>
+            </a:pPr>
+            <a:r>
+              <a:rPr lang="en-US" altLang="zh-CN" dirty="0" smtClean="0"/>
+              <a:t>Paper – </a:t>
+            </a:r>
+            <a:r>
+              <a:rPr lang="zh-CN" altLang="en-US" dirty="0" smtClean="0"/>
+              <a:t>学术论文</a:t>
+            </a:r>
+            <a:endParaRPr lang="en-US" altLang="zh-CN" dirty="0" smtClean="0"/>
+          </a:p>
+          <a:p>
+            <a:pPr marL="800100" lvl="1" indent="-342900">
+              <a:buFont typeface="Wingdings" panose="05000000000000000000" pitchFamily="2" charset="2"/>
+              <a:buChar char="Ø"/>
+            </a:pPr>
+            <a:r>
+              <a:rPr lang="en-US" altLang="zh-CN" dirty="0" smtClean="0"/>
+              <a:t>Journal Article   [J]</a:t>
+            </a:r>
+          </a:p>
+          <a:p>
+            <a:pPr marL="800100" lvl="1" indent="-342900">
+              <a:buFont typeface="Wingdings" panose="05000000000000000000" pitchFamily="2" charset="2"/>
+              <a:buChar char="Ø"/>
+            </a:pPr>
+            <a:r>
+              <a:rPr lang="en-US" altLang="zh-CN" dirty="0" smtClean="0"/>
+              <a:t>Conference Proceedings    [C]</a:t>
+            </a:r>
+          </a:p>
+          <a:p>
+            <a:pPr marL="342900" indent="-342900">
+              <a:buFont typeface="Wingdings" panose="05000000000000000000" pitchFamily="2" charset="2"/>
+              <a:buChar char="l"/>
+            </a:pPr>
+            <a:r>
+              <a:rPr lang="en-US" altLang="zh-CN" dirty="0" smtClean="0"/>
+              <a:t>Book        [M]    - </a:t>
+            </a:r>
+            <a:r>
+              <a:rPr lang="zh-CN" altLang="en-US" dirty="0" smtClean="0"/>
+              <a:t>学术专著</a:t>
+            </a:r>
+            <a:endParaRPr lang="en-US" altLang="zh-CN" dirty="0" smtClean="0"/>
+          </a:p>
+          <a:p>
+            <a:pPr marL="800100" lvl="1" indent="-342900">
+              <a:buFont typeface="Wingdings" panose="05000000000000000000" pitchFamily="2" charset="2"/>
+              <a:buChar char="Ø"/>
+            </a:pPr>
+            <a:r>
+              <a:rPr lang="en-US" altLang="zh-CN" dirty="0" smtClean="0"/>
+              <a:t>Book section</a:t>
+            </a:r>
+          </a:p>
+          <a:p>
+            <a:pPr marL="342900" indent="-342900">
+              <a:buFont typeface="Wingdings" panose="05000000000000000000" pitchFamily="2" charset="2"/>
+              <a:buChar char="l"/>
+            </a:pPr>
+            <a:r>
+              <a:rPr lang="en-US" altLang="zh-CN" dirty="0" smtClean="0"/>
+              <a:t>Report     [R]     - </a:t>
+            </a:r>
+            <a:r>
+              <a:rPr lang="zh-CN" altLang="en-US" dirty="0" smtClean="0"/>
+              <a:t>学术报告</a:t>
+            </a:r>
+            <a:endParaRPr lang="en-US" altLang="zh-CN" dirty="0" smtClean="0"/>
+          </a:p>
+          <a:p>
+            <a:pPr marL="342900" indent="-342900">
+              <a:buFont typeface="Wingdings" panose="05000000000000000000" pitchFamily="2" charset="2"/>
+              <a:buChar char="l"/>
+            </a:pPr>
+            <a:r>
+              <a:rPr lang="en-US" altLang="zh-CN" dirty="0"/>
+              <a:t>Thesis    or     </a:t>
+            </a:r>
+            <a:r>
+              <a:rPr lang="en-US" altLang="zh-CN" dirty="0" smtClean="0"/>
+              <a:t>Dissertation     [D]   - </a:t>
+            </a:r>
+            <a:r>
+              <a:rPr lang="zh-CN" altLang="en-US" dirty="0" smtClean="0"/>
+              <a:t>学位论文</a:t>
+            </a:r>
+            <a:endParaRPr lang="en-US" altLang="zh-CN" dirty="0" smtClean="0"/>
+          </a:p>
+          <a:p>
+            <a:pPr marL="800100" lvl="1" indent="-342900">
+              <a:buFont typeface="Wingdings" panose="05000000000000000000" pitchFamily="2" charset="2"/>
+              <a:buChar char="Ø"/>
+            </a:pPr>
+            <a:r>
+              <a:rPr lang="zh-CN" altLang="en-US" dirty="0" smtClean="0"/>
+              <a:t>硕士可称</a:t>
+            </a:r>
+            <a:r>
+              <a:rPr lang="en-US" altLang="zh-CN" dirty="0" smtClean="0"/>
+              <a:t>Thesis</a:t>
+            </a:r>
+          </a:p>
+          <a:p>
+            <a:pPr marL="800100" lvl="1" indent="-342900">
+              <a:buFont typeface="Wingdings" panose="05000000000000000000" pitchFamily="2" charset="2"/>
+              <a:buChar char="Ø"/>
+            </a:pPr>
+            <a:r>
+              <a:rPr lang="zh-CN" altLang="en-US" dirty="0" smtClean="0"/>
+              <a:t>博士可称</a:t>
+            </a:r>
+            <a:r>
+              <a:rPr lang="en-US" altLang="zh-CN" dirty="0" smtClean="0"/>
+              <a:t>Thesis or </a:t>
+            </a:r>
+            <a:r>
+              <a:rPr lang="en-US" altLang="zh-CN" dirty="0"/>
+              <a:t>Dissertation</a:t>
+            </a:r>
+          </a:p>
+        </p:txBody>
+      </p:sp>
+      <p:sp>
+        <p:nvSpPr>
+          <p:cNvPr id="3" name="标题 2"/>
+          <p:cNvSpPr>
+            <a:spLocks noGrp="1"/>
+          </p:cNvSpPr>
+          <p:nvPr>
+            <p:ph type="title"/>
+          </p:nvPr>
+        </p:nvSpPr>
+        <p:spPr/>
+        <p:txBody>
+          <a:bodyPr/>
+          <a:lstStyle/>
+          <a:p>
+            <a:r>
+              <a:rPr lang="en-US" altLang="zh-CN" dirty="0"/>
+              <a:t>Reference</a:t>
+            </a:r>
+            <a:endParaRPr lang="zh-CN" altLang="en-US" dirty="0"/>
+          </a:p>
+        </p:txBody>
+      </p:sp>
+    </p:spTree>
+    <p:extLst>
+      <p:ext uri="{BB962C8B-B14F-4D97-AF65-F5344CB8AC3E}">
+        <p14:creationId xmlns:p14="http://schemas.microsoft.com/office/powerpoint/2010/main" val="212927064"/>
+      </p:ext>
+    </p:extLst>
+  </p:cSld>
+  <p:clrMapOvr>
+    <a:masterClrMapping/>
+  </p:clrMapOvr>
+</p:sld>
+</file>
+
+<file path=ppt/slides/slide41.xml><?xml version="1.0" encoding="utf-8"?>
+<p:sld xmlns:a="http://schemas.openxmlformats.org/drawingml/2006/main" xmlns:r="http://schemas.openxmlformats.org/officeDocument/2006/relationships" xmlns:p="http://schemas.openxmlformats.org/presentationml/2006/main">
+  <p:cSld>
+    <p:spTree>
+      <p:nvGrpSpPr>
+        <p:cNvPr id="1" name=""/>
+        <p:cNvGrpSpPr/>
+        <p:nvPr/>
+      </p:nvGrpSpPr>
+      <p:grpSpPr>
+        <a:xfrm>
+          <a:off x="0" y="0"/>
+          <a:ext cx="0" cy="0"/>
+          <a:chOff x="0" y="0"/>
+          <a:chExt cx="0" cy="0"/>
+        </a:xfrm>
+      </p:grpSpPr>
+      <p:sp>
+        <p:nvSpPr>
+          <p:cNvPr id="2" name="内容占位符 1"/>
+          <p:cNvSpPr>
+            <a:spLocks noGrp="1"/>
+          </p:cNvSpPr>
+          <p:nvPr>
+            <p:ph sz="half" idx="2"/>
+          </p:nvPr>
+        </p:nvSpPr>
+        <p:spPr/>
+        <p:txBody>
+          <a:bodyPr/>
+          <a:lstStyle/>
+          <a:p>
+            <a:pPr marL="342900" indent="-342900">
+              <a:buFont typeface="Wingdings" panose="05000000000000000000" pitchFamily="2" charset="2"/>
+              <a:buChar char="l"/>
+            </a:pPr>
+            <a:r>
+              <a:rPr lang="en-US" altLang="zh-CN" dirty="0" smtClean="0"/>
               <a:t>Install word plugin</a:t>
             </a:r>
           </a:p>
@@ -10900,24 +13790,6 @@
             <a:endParaRPr lang="en-US" altLang="zh-CN" dirty="0"/>
           </a:p>
           <a:p>
-            <a:pPr marL="342900" indent="-342900">
-              <a:buFont typeface="Wingdings" panose="05000000000000000000" pitchFamily="2" charset="2"/>
-              <a:buChar char="l"/>
-            </a:pPr>
-            <a:endParaRPr lang="en-US" altLang="zh-CN" dirty="0" smtClean="0"/>
-          </a:p>
-          <a:p>
-            <a:pPr marL="342900" indent="-342900">
-              <a:buFont typeface="Wingdings" panose="05000000000000000000" pitchFamily="2" charset="2"/>
-              <a:buChar char="l"/>
-            </a:pPr>
-            <a:endParaRPr lang="en-US" altLang="zh-CN" dirty="0"/>
-          </a:p>
-          <a:p>
-            <a:pPr marL="342900" indent="-342900">
-              <a:buFont typeface="Wingdings" panose="05000000000000000000" pitchFamily="2" charset="2"/>
-              <a:buChar char="l"/>
-            </a:pPr>
             <a:endParaRPr lang="en-US" altLang="zh-CN" dirty="0" smtClean="0"/>
           </a:p>
           <a:p>
@@ -11019,382 +13891,7 @@
 </p:sld>
 </file>
 
-<file path=ppt/slides/slide3.xml><?xml version="1.0" encoding="utf-8"?>
-<p:sld xmlns:a="http://schemas.openxmlformats.org/drawingml/2006/main" xmlns:r="http://schemas.openxmlformats.org/officeDocument/2006/relationships" xmlns:p="http://schemas.openxmlformats.org/presentationml/2006/main">
-  <p:cSld>
-    <p:spTree>
-      <p:nvGrpSpPr>
-        <p:cNvPr id="1" name=""/>
-        <p:cNvGrpSpPr/>
-        <p:nvPr/>
-      </p:nvGrpSpPr>
-      <p:grpSpPr>
-        <a:xfrm>
-          <a:off x="0" y="0"/>
-          <a:ext cx="0" cy="0"/>
-          <a:chOff x="0" y="0"/>
-          <a:chExt cx="0" cy="0"/>
-        </a:xfrm>
-      </p:grpSpPr>
-      <p:sp>
-        <p:nvSpPr>
-          <p:cNvPr id="2" name="内容占位符 1"/>
-          <p:cNvSpPr>
-            <a:spLocks noGrp="1"/>
-          </p:cNvSpPr>
-          <p:nvPr>
-            <p:ph sz="half" idx="2"/>
-          </p:nvPr>
-        </p:nvSpPr>
-        <p:spPr/>
-        <p:txBody>
-          <a:bodyPr/>
-          <a:lstStyle/>
-          <a:p>
-            <a:pPr marL="342900" indent="-342900">
-              <a:buFont typeface="Wingdings" panose="05000000000000000000" pitchFamily="2" charset="2"/>
-              <a:buChar char="l"/>
-            </a:pPr>
-            <a:r>
-              <a:rPr lang="en-US" altLang="zh-CN" dirty="0"/>
-              <a:t>What is </a:t>
-            </a:r>
-            <a:r>
-              <a:rPr lang="en-US" altLang="zh-CN" dirty="0" err="1"/>
-              <a:t>LaTeX</a:t>
-            </a:r>
-            <a:r>
-              <a:rPr lang="en-US" altLang="zh-CN" dirty="0" smtClean="0"/>
-              <a:t>?</a:t>
-            </a:r>
-          </a:p>
-          <a:p>
-            <a:pPr marL="342900" indent="-342900">
-              <a:buFont typeface="Wingdings" panose="05000000000000000000" pitchFamily="2" charset="2"/>
-              <a:buChar char="l"/>
-            </a:pPr>
-            <a:endParaRPr lang="en-US" altLang="zh-CN" dirty="0"/>
-          </a:p>
-          <a:p>
-            <a:pPr marL="342900" indent="-342900">
-              <a:buFont typeface="Wingdings" panose="05000000000000000000" pitchFamily="2" charset="2"/>
-              <a:buChar char="l"/>
-            </a:pPr>
-            <a:endParaRPr lang="en-US" altLang="zh-CN" dirty="0" smtClean="0"/>
-          </a:p>
-          <a:p>
-            <a:pPr marL="342900" indent="-342900">
-              <a:buFont typeface="Wingdings" panose="05000000000000000000" pitchFamily="2" charset="2"/>
-              <a:buChar char="l"/>
-            </a:pPr>
-            <a:endParaRPr lang="en-US" altLang="zh-CN" dirty="0"/>
-          </a:p>
-          <a:p>
-            <a:pPr marL="342900" indent="-342900">
-              <a:buFont typeface="Wingdings" panose="05000000000000000000" pitchFamily="2" charset="2"/>
-              <a:buChar char="l"/>
-            </a:pPr>
-            <a:endParaRPr lang="en-US" altLang="zh-CN" dirty="0" smtClean="0"/>
-          </a:p>
-          <a:p>
-            <a:pPr marL="342900" indent="-342900">
-              <a:buFont typeface="Wingdings" panose="05000000000000000000" pitchFamily="2" charset="2"/>
-              <a:buChar char="l"/>
-            </a:pPr>
-            <a:r>
-              <a:rPr lang="en-US" altLang="zh-CN" dirty="0"/>
-              <a:t>Why use </a:t>
-            </a:r>
-            <a:r>
-              <a:rPr lang="en-US" altLang="zh-CN" dirty="0" err="1"/>
-              <a:t>LaTeX</a:t>
-            </a:r>
-            <a:r>
-              <a:rPr lang="en-US" altLang="zh-CN" dirty="0"/>
-              <a:t>?</a:t>
-            </a:r>
-            <a:endParaRPr lang="zh-CN" altLang="en-US" dirty="0"/>
-          </a:p>
-        </p:txBody>
-      </p:sp>
-      <p:sp>
-        <p:nvSpPr>
-          <p:cNvPr id="3" name="标题 2"/>
-          <p:cNvSpPr>
-            <a:spLocks noGrp="1"/>
-          </p:cNvSpPr>
-          <p:nvPr>
-            <p:ph type="title"/>
-          </p:nvPr>
-        </p:nvSpPr>
-        <p:spPr/>
-        <p:txBody>
-          <a:bodyPr>
-            <a:normAutofit/>
-          </a:bodyPr>
-          <a:lstStyle/>
-          <a:p>
-            <a:r>
-              <a:rPr lang="en-US" altLang="zh-CN" dirty="0"/>
-              <a:t>Set up for </a:t>
-            </a:r>
-            <a:r>
-              <a:rPr lang="en-US" altLang="zh-CN" dirty="0" err="1" smtClean="0"/>
-              <a:t>LaTeX</a:t>
-            </a:r>
-            <a:endParaRPr lang="zh-CN" altLang="en-US" dirty="0"/>
-          </a:p>
-        </p:txBody>
-      </p:sp>
-      <p:sp>
-        <p:nvSpPr>
-          <p:cNvPr id="4" name="矩形 3"/>
-          <p:cNvSpPr/>
-          <p:nvPr/>
-        </p:nvSpPr>
-        <p:spPr>
-          <a:xfrm>
-            <a:off x="827584" y="1879664"/>
-            <a:ext cx="7488832" cy="1477328"/>
-          </a:xfrm>
-          <a:prstGeom prst="rect">
-            <a:avLst/>
-          </a:prstGeom>
-        </p:spPr>
-        <p:txBody>
-          <a:bodyPr wrap="square">
-            <a:spAutoFit/>
-          </a:bodyPr>
-          <a:lstStyle/>
-          <a:p>
-            <a:pPr algn="just"/>
-            <a:r>
-              <a:rPr lang="en-US" altLang="zh-CN" dirty="0" err="1">
-                <a:solidFill>
-                  <a:srgbClr val="24292E"/>
-                </a:solidFill>
-                <a:latin typeface="-apple-system"/>
-              </a:rPr>
-              <a:t>LaTeX</a:t>
-            </a:r>
-            <a:r>
-              <a:rPr lang="en-US" altLang="zh-CN" dirty="0">
-                <a:solidFill>
-                  <a:srgbClr val="24292E"/>
-                </a:solidFill>
-                <a:latin typeface="-apple-system"/>
-              </a:rPr>
-              <a:t>, which is pronounced «</a:t>
-            </a:r>
-            <a:r>
-              <a:rPr lang="en-US" altLang="zh-CN" dirty="0" err="1">
-                <a:solidFill>
-                  <a:srgbClr val="24292E"/>
-                </a:solidFill>
-                <a:latin typeface="-apple-system"/>
-              </a:rPr>
-              <a:t>Lah</a:t>
-            </a:r>
-            <a:r>
-              <a:rPr lang="en-US" altLang="zh-CN" dirty="0">
-                <a:solidFill>
-                  <a:srgbClr val="24292E"/>
-                </a:solidFill>
-                <a:latin typeface="-apple-system"/>
-              </a:rPr>
-              <a:t>-tech» or «Lay-tech» (to rhyme with «blech»), is a document preparation system for high-quality typesetting. It is most often used for medium-to-large technical or scientific documents but it can be used for almost any form of publishing.</a:t>
-            </a:r>
-            <a:endParaRPr lang="zh-CN" altLang="en-US" dirty="0"/>
-          </a:p>
-        </p:txBody>
-      </p:sp>
-      <p:sp>
-        <p:nvSpPr>
-          <p:cNvPr id="5" name="矩形 4"/>
-          <p:cNvSpPr/>
-          <p:nvPr/>
-        </p:nvSpPr>
-        <p:spPr>
-          <a:xfrm>
-            <a:off x="755576" y="3970263"/>
-            <a:ext cx="8388424" cy="2308324"/>
-          </a:xfrm>
-          <a:prstGeom prst="rect">
-            <a:avLst/>
-          </a:prstGeom>
-        </p:spPr>
-        <p:txBody>
-          <a:bodyPr wrap="square">
-            <a:spAutoFit/>
-          </a:bodyPr>
-          <a:lstStyle/>
-          <a:p>
-            <a:pPr marL="285750" indent="-285750">
-              <a:buFont typeface="Wingdings" panose="05000000000000000000" pitchFamily="2" charset="2"/>
-              <a:buChar char="Ø"/>
-            </a:pPr>
-            <a:r>
-              <a:rPr lang="en-US" altLang="zh-CN" dirty="0" err="1" smtClean="0">
-                <a:solidFill>
-                  <a:srgbClr val="24292E"/>
-                </a:solidFill>
-                <a:latin typeface="-apple-system"/>
-              </a:rPr>
-              <a:t>LaTeX</a:t>
-            </a:r>
-            <a:r>
-              <a:rPr lang="en-US" altLang="zh-CN" dirty="0" smtClean="0">
-                <a:solidFill>
-                  <a:srgbClr val="24292E"/>
-                </a:solidFill>
-                <a:latin typeface="-apple-system"/>
-              </a:rPr>
-              <a:t> </a:t>
-            </a:r>
-            <a:r>
-              <a:rPr lang="en-US" altLang="zh-CN" dirty="0">
-                <a:solidFill>
-                  <a:srgbClr val="24292E"/>
-                </a:solidFill>
-                <a:latin typeface="-apple-system"/>
-              </a:rPr>
-              <a:t>is free, multiplatform.</a:t>
-            </a:r>
-          </a:p>
-          <a:p>
-            <a:pPr marL="285750" indent="-285750">
-              <a:buFont typeface="Wingdings" panose="05000000000000000000" pitchFamily="2" charset="2"/>
-              <a:buChar char="Ø"/>
-            </a:pPr>
-            <a:r>
-              <a:rPr lang="en-US" altLang="zh-CN" dirty="0" err="1">
-                <a:solidFill>
-                  <a:srgbClr val="24292E"/>
-                </a:solidFill>
-                <a:latin typeface="-apple-system"/>
-              </a:rPr>
-              <a:t>LaTeX</a:t>
-            </a:r>
-            <a:r>
-              <a:rPr lang="en-US" altLang="zh-CN" dirty="0">
-                <a:solidFill>
-                  <a:srgbClr val="24292E"/>
-                </a:solidFill>
-                <a:latin typeface="-apple-system"/>
-              </a:rPr>
-              <a:t> is just a text document (which can be opened by any text editor), readily converted to PDF.</a:t>
-            </a:r>
-          </a:p>
-          <a:p>
-            <a:pPr marL="285750" indent="-285750">
-              <a:buFont typeface="Wingdings" panose="05000000000000000000" pitchFamily="2" charset="2"/>
-              <a:buChar char="Ø"/>
-            </a:pPr>
-            <a:r>
-              <a:rPr lang="en-US" altLang="zh-CN" dirty="0" err="1">
-                <a:solidFill>
-                  <a:srgbClr val="24292E"/>
-                </a:solidFill>
-                <a:latin typeface="-apple-system"/>
-              </a:rPr>
-              <a:t>LaTeX</a:t>
-            </a:r>
-            <a:r>
-              <a:rPr lang="en-US" altLang="zh-CN" dirty="0">
-                <a:solidFill>
-                  <a:srgbClr val="24292E"/>
-                </a:solidFill>
-                <a:latin typeface="-apple-system"/>
-              </a:rPr>
-              <a:t> separates content and style. Style once, then focus on content.</a:t>
-            </a:r>
-          </a:p>
-          <a:p>
-            <a:pPr marL="285750" indent="-285750">
-              <a:buFont typeface="Wingdings" panose="05000000000000000000" pitchFamily="2" charset="2"/>
-              <a:buChar char="Ø"/>
-            </a:pPr>
-            <a:r>
-              <a:rPr lang="en-US" altLang="zh-CN" dirty="0">
-                <a:solidFill>
-                  <a:srgbClr val="24292E"/>
-                </a:solidFill>
-                <a:latin typeface="-apple-system"/>
-              </a:rPr>
-              <a:t>The workflow is faster compared to MS Word.</a:t>
-            </a:r>
-          </a:p>
-          <a:p>
-            <a:pPr marL="285750" indent="-285750">
-              <a:buFont typeface="Wingdings" panose="05000000000000000000" pitchFamily="2" charset="2"/>
-              <a:buChar char="Ø"/>
-            </a:pPr>
-            <a:r>
-              <a:rPr lang="en-US" altLang="zh-CN" dirty="0" err="1">
-                <a:solidFill>
-                  <a:srgbClr val="24292E"/>
-                </a:solidFill>
-                <a:latin typeface="-apple-system"/>
-              </a:rPr>
-              <a:t>LaTeX</a:t>
-            </a:r>
-            <a:r>
-              <a:rPr lang="en-US" altLang="zh-CN" dirty="0">
-                <a:solidFill>
-                  <a:srgbClr val="24292E"/>
-                </a:solidFill>
-                <a:latin typeface="-apple-system"/>
-              </a:rPr>
-              <a:t> is widely used for scientific topics.</a:t>
-            </a:r>
-          </a:p>
-          <a:p>
-            <a:pPr marL="285750" indent="-285750">
-              <a:buFont typeface="Wingdings" panose="05000000000000000000" pitchFamily="2" charset="2"/>
-              <a:buChar char="Ø"/>
-            </a:pPr>
-            <a:r>
-              <a:rPr lang="en-US" altLang="zh-CN" dirty="0" err="1">
-                <a:solidFill>
-                  <a:srgbClr val="24292E"/>
-                </a:solidFill>
-                <a:latin typeface="-apple-system"/>
-              </a:rPr>
-              <a:t>LaTeX</a:t>
-            </a:r>
-            <a:r>
-              <a:rPr lang="en-US" altLang="zh-CN" dirty="0">
-                <a:solidFill>
-                  <a:srgbClr val="24292E"/>
-                </a:solidFill>
-                <a:latin typeface="-apple-system"/>
-              </a:rPr>
-              <a:t> is simply the best option when it comes to typesetting math expressions.</a:t>
-            </a:r>
-            <a:endParaRPr lang="en-US" altLang="zh-CN" b="0" i="0" dirty="0">
-              <a:solidFill>
-                <a:srgbClr val="24292E"/>
-              </a:solidFill>
-              <a:effectLst/>
-              <a:latin typeface="-apple-system"/>
-            </a:endParaRPr>
-          </a:p>
-        </p:txBody>
-      </p:sp>
-    </p:spTree>
-    <p:extLst>
-      <p:ext uri="{BB962C8B-B14F-4D97-AF65-F5344CB8AC3E}">
-        <p14:creationId xmlns:p14="http://schemas.microsoft.com/office/powerpoint/2010/main" val="1365063806"/>
-      </p:ext>
-    </p:extLst>
-  </p:cSld>
-  <p:clrMapOvr>
-    <a:masterClrMapping/>
-  </p:clrMapOvr>
-</p:sld>
-</file>
-
-<file path=ppt/slides/slide30.xml><?xml version="1.0" encoding="utf-8"?>
+<file path=ppt/slides/slide42.xml><?xml version="1.0" encoding="utf-8"?>
 <p:sld xmlns:a="http://schemas.openxmlformats.org/drawingml/2006/main" xmlns:r="http://schemas.openxmlformats.org/officeDocument/2006/relationships" xmlns:p="http://schemas.openxmlformats.org/presentationml/2006/main">
   <p:cSld>
     <p:spTree>
@@ -11568,7 +14065,7 @@
 </p:sld>
 </file>
 
-<file path=ppt/slides/slide31.xml><?xml version="1.0" encoding="utf-8"?>
+<file path=ppt/slides/slide43.xml><?xml version="1.0" encoding="utf-8"?>
 <p:sld xmlns:a="http://schemas.openxmlformats.org/drawingml/2006/main" xmlns:r="http://schemas.openxmlformats.org/officeDocument/2006/relationships" xmlns:p="http://schemas.openxmlformats.org/presentationml/2006/main">
   <p:cSld>
     <p:spTree>
@@ -11743,7 +14240,7 @@
 </p:sld>
 </file>
 
-<file path=ppt/slides/slide32.xml><?xml version="1.0" encoding="utf-8"?>
+<file path=ppt/slides/slide44.xml><?xml version="1.0" encoding="utf-8"?>
 <p:sld xmlns:a="http://schemas.openxmlformats.org/drawingml/2006/main" xmlns:r="http://schemas.openxmlformats.org/officeDocument/2006/relationships" xmlns:p="http://schemas.openxmlformats.org/presentationml/2006/main">
   <p:cSld>
     <p:spTree>
@@ -11978,7 +14475,7 @@
 </p:sld>
 </file>
 
-<file path=ppt/slides/slide33.xml><?xml version="1.0" encoding="utf-8"?>
+<file path=ppt/slides/slide45.xml><?xml version="1.0" encoding="utf-8"?>
 <p:sld xmlns:a="http://schemas.openxmlformats.org/drawingml/2006/main" xmlns:r="http://schemas.openxmlformats.org/officeDocument/2006/relationships" xmlns:p="http://schemas.openxmlformats.org/presentationml/2006/main">
   <p:cSld>
     <p:spTree>
@@ -12160,7 +14657,441 @@
 </p:sld>
 </file>
 
-<file path=ppt/slides/slide34.xml><?xml version="1.0" encoding="utf-8"?>
+<file path=ppt/slides/slide46.xml><?xml version="1.0" encoding="utf-8"?>
+<p:sld xmlns:a="http://schemas.openxmlformats.org/drawingml/2006/main" xmlns:r="http://schemas.openxmlformats.org/officeDocument/2006/relationships" xmlns:p="http://schemas.openxmlformats.org/presentationml/2006/main">
+  <p:cSld>
+    <p:spTree>
+      <p:nvGrpSpPr>
+        <p:cNvPr id="1" name=""/>
+        <p:cNvGrpSpPr/>
+        <p:nvPr/>
+      </p:nvGrpSpPr>
+      <p:grpSpPr>
+        <a:xfrm>
+          <a:off x="0" y="0"/>
+          <a:ext cx="0" cy="0"/>
+          <a:chOff x="0" y="0"/>
+          <a:chExt cx="0" cy="0"/>
+        </a:xfrm>
+      </p:grpSpPr>
+      <p:sp>
+        <p:nvSpPr>
+          <p:cNvPr id="2" name="内容占位符 1"/>
+          <p:cNvSpPr>
+            <a:spLocks noGrp="1"/>
+          </p:cNvSpPr>
+          <p:nvPr>
+            <p:ph sz="half" idx="2"/>
+          </p:nvPr>
+        </p:nvSpPr>
+        <p:spPr/>
+        <p:txBody>
+          <a:bodyPr/>
+          <a:lstStyle/>
+          <a:p>
+            <a:pPr marL="342900" indent="-342900">
+              <a:buFont typeface="Wingdings" panose="05000000000000000000" pitchFamily="2" charset="2"/>
+              <a:buChar char="l"/>
+            </a:pPr>
+            <a:r>
+              <a:rPr lang="en-US" altLang="zh-CN" dirty="0" smtClean="0"/>
+              <a:t>Import style 1</a:t>
+            </a:r>
+          </a:p>
+          <a:p>
+            <a:pPr marL="914400" lvl="1" indent="-457200">
+              <a:buFont typeface="+mj-lt"/>
+              <a:buAutoNum type="arabicPeriod"/>
+            </a:pPr>
+            <a:r>
+              <a:rPr lang="en-US" altLang="zh-CN" dirty="0">
+                <a:hlinkClick r:id="rId2"/>
+              </a:rPr>
+              <a:t>http://</a:t>
+            </a:r>
+            <a:r>
+              <a:rPr lang="en-US" altLang="zh-CN" dirty="0" smtClean="0">
+                <a:hlinkClick r:id="rId2"/>
+              </a:rPr>
+              <a:t>www.zotero.org/styles</a:t>
+            </a:r>
+            <a:endParaRPr lang="en-US" altLang="zh-CN" dirty="0" smtClean="0"/>
+          </a:p>
+          <a:p>
+            <a:pPr marL="914400" lvl="1" indent="-457200">
+              <a:buFont typeface="+mj-lt"/>
+              <a:buAutoNum type="arabicPeriod"/>
+            </a:pPr>
+            <a:r>
+              <a:rPr lang="en-US" altLang="zh-CN" dirty="0" smtClean="0"/>
+              <a:t>Download </a:t>
+            </a:r>
+            <a:r>
+              <a:rPr lang="en-US" altLang="zh-CN" dirty="0" err="1" smtClean="0"/>
+              <a:t>csl</a:t>
+            </a:r>
+            <a:r>
+              <a:rPr lang="en-US" altLang="zh-CN" dirty="0" smtClean="0"/>
+              <a:t> file</a:t>
+            </a:r>
+          </a:p>
+          <a:p>
+            <a:pPr marL="914400" lvl="1" indent="-457200">
+              <a:buFont typeface="+mj-lt"/>
+              <a:buAutoNum type="arabicPeriod"/>
+            </a:pPr>
+            <a:r>
+              <a:rPr lang="en-US" altLang="zh-CN" dirty="0"/>
+              <a:t>Copy to </a:t>
+            </a:r>
+            <a:r>
+              <a:rPr lang="en-US" altLang="zh-CN" dirty="0" smtClean="0"/>
+              <a:t>citationStyles-1.0 folder that you install </a:t>
+            </a:r>
+            <a:r>
+              <a:rPr lang="en-US" altLang="zh-CN" dirty="0" err="1" smtClean="0"/>
+              <a:t>mendeley</a:t>
+            </a:r>
+            <a:r>
+              <a:rPr lang="en-US" altLang="zh-CN" dirty="0" smtClean="0"/>
+              <a:t>.</a:t>
+            </a:r>
+          </a:p>
+          <a:p>
+            <a:pPr marL="457200" indent="-457200">
+              <a:buFont typeface="Wingdings" panose="05000000000000000000" pitchFamily="2" charset="2"/>
+              <a:buChar char="l"/>
+            </a:pPr>
+            <a:endParaRPr lang="en-US" altLang="zh-CN" dirty="0"/>
+          </a:p>
+          <a:p>
+            <a:pPr marL="457200" indent="-457200">
+              <a:buFont typeface="Wingdings" panose="05000000000000000000" pitchFamily="2" charset="2"/>
+              <a:buChar char="l"/>
+            </a:pPr>
+            <a:r>
+              <a:rPr lang="en-US" altLang="zh-CN" dirty="0" smtClean="0"/>
+              <a:t>Import style 2</a:t>
+            </a:r>
+          </a:p>
+          <a:p>
+            <a:pPr marL="457200" indent="-457200">
+              <a:buFont typeface="Wingdings" panose="05000000000000000000" pitchFamily="2" charset="2"/>
+              <a:buChar char="l"/>
+            </a:pPr>
+            <a:r>
+              <a:rPr lang="en-US" altLang="zh-CN" dirty="0" smtClean="0"/>
+              <a:t>Click “More styles”</a:t>
+            </a:r>
+          </a:p>
+          <a:p>
+            <a:pPr marL="457200" indent="-457200">
+              <a:buFont typeface="Wingdings" panose="05000000000000000000" pitchFamily="2" charset="2"/>
+              <a:buChar char="l"/>
+            </a:pPr>
+            <a:endParaRPr lang="en-US" altLang="zh-CN" dirty="0" smtClean="0"/>
+          </a:p>
+        </p:txBody>
+      </p:sp>
+      <p:sp>
+        <p:nvSpPr>
+          <p:cNvPr id="3" name="标题 2"/>
+          <p:cNvSpPr>
+            <a:spLocks noGrp="1"/>
+          </p:cNvSpPr>
+          <p:nvPr>
+            <p:ph type="title"/>
+          </p:nvPr>
+        </p:nvSpPr>
+        <p:spPr/>
+        <p:txBody>
+          <a:bodyPr/>
+          <a:lstStyle/>
+          <a:p>
+            <a:r>
+              <a:rPr lang="en-US" altLang="zh-CN" dirty="0"/>
+              <a:t>Reference</a:t>
+            </a:r>
+            <a:endParaRPr lang="zh-CN" altLang="en-US" dirty="0"/>
+          </a:p>
+        </p:txBody>
+      </p:sp>
+      <p:pic>
+        <p:nvPicPr>
+          <p:cNvPr id="4" name="图片 3"/>
+          <p:cNvPicPr>
+            <a:picLocks noChangeAspect="1"/>
+          </p:cNvPicPr>
+          <p:nvPr/>
+        </p:nvPicPr>
+        <p:blipFill>
+          <a:blip r:embed="rId3"/>
+          <a:stretch>
+            <a:fillRect/>
+          </a:stretch>
+        </p:blipFill>
+        <p:spPr>
+          <a:xfrm>
+            <a:off x="3364968" y="3080274"/>
+            <a:ext cx="5813296" cy="3045889"/>
+          </a:xfrm>
+          <a:prstGeom prst="rect">
+            <a:avLst/>
+          </a:prstGeom>
+        </p:spPr>
+      </p:pic>
+    </p:spTree>
+    <p:extLst>
+      <p:ext uri="{BB962C8B-B14F-4D97-AF65-F5344CB8AC3E}">
+        <p14:creationId xmlns:p14="http://schemas.microsoft.com/office/powerpoint/2010/main" val="1627531599"/>
+      </p:ext>
+    </p:extLst>
+  </p:cSld>
+  <p:clrMapOvr>
+    <a:masterClrMapping/>
+  </p:clrMapOvr>
+</p:sld>
+</file>
+
+<file path=ppt/slides/slide47.xml><?xml version="1.0" encoding="utf-8"?>
+<p:sld xmlns:a="http://schemas.openxmlformats.org/drawingml/2006/main" xmlns:r="http://schemas.openxmlformats.org/officeDocument/2006/relationships" xmlns:p="http://schemas.openxmlformats.org/presentationml/2006/main">
+  <p:cSld>
+    <p:spTree>
+      <p:nvGrpSpPr>
+        <p:cNvPr id="1" name=""/>
+        <p:cNvGrpSpPr/>
+        <p:nvPr/>
+      </p:nvGrpSpPr>
+      <p:grpSpPr>
+        <a:xfrm>
+          <a:off x="0" y="0"/>
+          <a:ext cx="0" cy="0"/>
+          <a:chOff x="0" y="0"/>
+          <a:chExt cx="0" cy="0"/>
+        </a:xfrm>
+      </p:grpSpPr>
+      <p:sp>
+        <p:nvSpPr>
+          <p:cNvPr id="2" name="内容占位符 1"/>
+          <p:cNvSpPr>
+            <a:spLocks noGrp="1"/>
+          </p:cNvSpPr>
+          <p:nvPr>
+            <p:ph sz="half" idx="2"/>
+          </p:nvPr>
+        </p:nvSpPr>
+        <p:spPr/>
+        <p:txBody>
+          <a:bodyPr/>
+          <a:lstStyle/>
+          <a:p>
+            <a:pPr marL="342900" indent="-342900">
+              <a:buFont typeface="Wingdings" panose="05000000000000000000" pitchFamily="2" charset="2"/>
+              <a:buChar char="l"/>
+            </a:pPr>
+            <a:r>
+              <a:rPr lang="en-US" altLang="zh-CN" dirty="0" smtClean="0"/>
+              <a:t>Get More Styles</a:t>
+            </a:r>
+          </a:p>
+          <a:p>
+            <a:pPr marL="342900" indent="-342900">
+              <a:buFont typeface="Wingdings" panose="05000000000000000000" pitchFamily="2" charset="2"/>
+              <a:buChar char="l"/>
+            </a:pPr>
+            <a:r>
+              <a:rPr lang="en-US" altLang="zh-CN" dirty="0" smtClean="0"/>
+              <a:t>Search for “Chinese Std GB/T 7714-2005 (numeric, Chinese)”</a:t>
+            </a:r>
+          </a:p>
+          <a:p>
+            <a:pPr marL="342900" indent="-342900">
+              <a:buFont typeface="Wingdings" panose="05000000000000000000" pitchFamily="2" charset="2"/>
+              <a:buChar char="l"/>
+            </a:pPr>
+            <a:r>
+              <a:rPr lang="en-US" altLang="zh-CN" dirty="0" smtClean="0"/>
+              <a:t>For your thesis or journal article in Chinese </a:t>
+            </a:r>
+            <a:endParaRPr lang="zh-CN" altLang="en-US" dirty="0"/>
+          </a:p>
+        </p:txBody>
+      </p:sp>
+      <p:sp>
+        <p:nvSpPr>
+          <p:cNvPr id="3" name="标题 2"/>
+          <p:cNvSpPr>
+            <a:spLocks noGrp="1"/>
+          </p:cNvSpPr>
+          <p:nvPr>
+            <p:ph type="title"/>
+          </p:nvPr>
+        </p:nvSpPr>
+        <p:spPr/>
+        <p:txBody>
+          <a:bodyPr/>
+          <a:lstStyle/>
+          <a:p>
+            <a:r>
+              <a:rPr lang="en-US" altLang="zh-CN" dirty="0"/>
+              <a:t>Reference</a:t>
+            </a:r>
+            <a:endParaRPr lang="zh-CN" altLang="en-US" dirty="0"/>
+          </a:p>
+        </p:txBody>
+      </p:sp>
+      <p:pic>
+        <p:nvPicPr>
+          <p:cNvPr id="4" name="图片 3"/>
+          <p:cNvPicPr>
+            <a:picLocks noChangeAspect="1"/>
+          </p:cNvPicPr>
+          <p:nvPr/>
+        </p:nvPicPr>
+        <p:blipFill>
+          <a:blip r:embed="rId2"/>
+          <a:stretch>
+            <a:fillRect/>
+          </a:stretch>
+        </p:blipFill>
+        <p:spPr>
+          <a:xfrm>
+            <a:off x="4613489" y="2852936"/>
+            <a:ext cx="4089303" cy="3168575"/>
+          </a:xfrm>
+          <a:prstGeom prst="rect">
+            <a:avLst/>
+          </a:prstGeom>
+        </p:spPr>
+      </p:pic>
+    </p:spTree>
+    <p:extLst>
+      <p:ext uri="{BB962C8B-B14F-4D97-AF65-F5344CB8AC3E}">
+        <p14:creationId xmlns:p14="http://schemas.microsoft.com/office/powerpoint/2010/main" val="4064193394"/>
+      </p:ext>
+    </p:extLst>
+  </p:cSld>
+  <p:clrMapOvr>
+    <a:masterClrMapping/>
+  </p:clrMapOvr>
+</p:sld>
+</file>
+
+<file path=ppt/slides/slide48.xml><?xml version="1.0" encoding="utf-8"?>
+<p:sld xmlns:a="http://schemas.openxmlformats.org/drawingml/2006/main" xmlns:r="http://schemas.openxmlformats.org/officeDocument/2006/relationships" xmlns:p="http://schemas.openxmlformats.org/presentationml/2006/main">
+  <p:cSld>
+    <p:spTree>
+      <p:nvGrpSpPr>
+        <p:cNvPr id="1" name=""/>
+        <p:cNvGrpSpPr/>
+        <p:nvPr/>
+      </p:nvGrpSpPr>
+      <p:grpSpPr>
+        <a:xfrm>
+          <a:off x="0" y="0"/>
+          <a:ext cx="0" cy="0"/>
+          <a:chOff x="0" y="0"/>
+          <a:chExt cx="0" cy="0"/>
+        </a:xfrm>
+      </p:grpSpPr>
+      <p:sp>
+        <p:nvSpPr>
+          <p:cNvPr id="2" name="内容占位符 1"/>
+          <p:cNvSpPr>
+            <a:spLocks noGrp="1"/>
+          </p:cNvSpPr>
+          <p:nvPr>
+            <p:ph sz="half" idx="2"/>
+          </p:nvPr>
+        </p:nvSpPr>
+        <p:spPr/>
+        <p:txBody>
+          <a:bodyPr/>
+          <a:lstStyle/>
+          <a:p>
+            <a:pPr marL="342900" indent="-342900">
+              <a:buFont typeface="Wingdings" panose="05000000000000000000" pitchFamily="2" charset="2"/>
+              <a:buChar char="l"/>
+            </a:pPr>
+            <a:r>
+              <a:rPr lang="en-US" altLang="zh-CN" dirty="0" smtClean="0"/>
+              <a:t>Click “Installed” tab</a:t>
+            </a:r>
+          </a:p>
+          <a:p>
+            <a:pPr marL="342900" indent="-342900">
+              <a:buFont typeface="Wingdings" panose="05000000000000000000" pitchFamily="2" charset="2"/>
+              <a:buChar char="l"/>
+            </a:pPr>
+            <a:r>
+              <a:rPr lang="en-US" altLang="zh-CN" dirty="0" smtClean="0"/>
+              <a:t>Click “Use this Style”</a:t>
+            </a:r>
+            <a:endParaRPr lang="zh-CN" altLang="en-US" dirty="0"/>
+          </a:p>
+        </p:txBody>
+      </p:sp>
+      <p:sp>
+        <p:nvSpPr>
+          <p:cNvPr id="3" name="标题 2"/>
+          <p:cNvSpPr>
+            <a:spLocks noGrp="1"/>
+          </p:cNvSpPr>
+          <p:nvPr>
+            <p:ph type="title"/>
+          </p:nvPr>
+        </p:nvSpPr>
+        <p:spPr/>
+        <p:txBody>
+          <a:bodyPr/>
+          <a:lstStyle/>
+          <a:p>
+            <a:r>
+              <a:rPr lang="en-US" altLang="zh-CN" dirty="0"/>
+              <a:t>Reference</a:t>
+            </a:r>
+            <a:endParaRPr lang="zh-CN" altLang="en-US" dirty="0"/>
+          </a:p>
+        </p:txBody>
+      </p:sp>
+      <p:pic>
+        <p:nvPicPr>
+          <p:cNvPr id="4" name="图片 3"/>
+          <p:cNvPicPr>
+            <a:picLocks noChangeAspect="1"/>
+          </p:cNvPicPr>
+          <p:nvPr/>
+        </p:nvPicPr>
+        <p:blipFill>
+          <a:blip r:embed="rId2"/>
+          <a:stretch>
+            <a:fillRect/>
+          </a:stretch>
+        </p:blipFill>
+        <p:spPr>
+          <a:xfrm>
+            <a:off x="4538816" y="2924944"/>
+            <a:ext cx="4275457" cy="3312815"/>
+          </a:xfrm>
+          <a:prstGeom prst="rect">
+            <a:avLst/>
+          </a:prstGeom>
+        </p:spPr>
+      </p:pic>
+    </p:spTree>
+    <p:extLst>
+      <p:ext uri="{BB962C8B-B14F-4D97-AF65-F5344CB8AC3E}">
+        <p14:creationId xmlns:p14="http://schemas.microsoft.com/office/powerpoint/2010/main" val="2243336412"/>
+      </p:ext>
+    </p:extLst>
+  </p:cSld>
+  <p:clrMapOvr>
+    <a:masterClrMapping/>
+  </p:clrMapOvr>
+</p:sld>
+</file>
+
+<file path=ppt/slides/slide49.xml><?xml version="1.0" encoding="utf-8"?>
 <p:sld xmlns:a="http://schemas.openxmlformats.org/drawingml/2006/main" xmlns:r="http://schemas.openxmlformats.org/officeDocument/2006/relationships" xmlns:p="http://schemas.openxmlformats.org/presentationml/2006/main">
   <p:cSld>
     <p:spTree>
@@ -12299,7 +15230,115 @@
 </p:sld>
 </file>
 
-<file path=ppt/slides/slide35.xml><?xml version="1.0" encoding="utf-8"?>
+<file path=ppt/slides/slide5.xml><?xml version="1.0" encoding="utf-8"?>
+<p:sld xmlns:a="http://schemas.openxmlformats.org/drawingml/2006/main" xmlns:r="http://schemas.openxmlformats.org/officeDocument/2006/relationships" xmlns:p="http://schemas.openxmlformats.org/presentationml/2006/main">
+  <p:cSld>
+    <p:spTree>
+      <p:nvGrpSpPr>
+        <p:cNvPr id="1" name=""/>
+        <p:cNvGrpSpPr/>
+        <p:nvPr/>
+      </p:nvGrpSpPr>
+      <p:grpSpPr>
+        <a:xfrm>
+          <a:off x="0" y="0"/>
+          <a:ext cx="0" cy="0"/>
+          <a:chOff x="0" y="0"/>
+          <a:chExt cx="0" cy="0"/>
+        </a:xfrm>
+      </p:grpSpPr>
+      <p:sp>
+        <p:nvSpPr>
+          <p:cNvPr id="2" name="内容占位符 1"/>
+          <p:cNvSpPr>
+            <a:spLocks noGrp="1"/>
+          </p:cNvSpPr>
+          <p:nvPr>
+            <p:ph sz="half" idx="2"/>
+          </p:nvPr>
+        </p:nvSpPr>
+        <p:spPr/>
+        <p:txBody>
+          <a:bodyPr/>
+          <a:lstStyle/>
+          <a:p>
+            <a:pPr marL="342900" indent="-342900">
+              <a:buFont typeface="Wingdings" panose="05000000000000000000" pitchFamily="2" charset="2"/>
+              <a:buChar char="l"/>
+            </a:pPr>
+            <a:r>
+              <a:rPr lang="en-US" altLang="zh-CN" dirty="0" smtClean="0"/>
+              <a:t>Installation</a:t>
+            </a:r>
+            <a:endParaRPr lang="zh-CN" altLang="en-US" dirty="0"/>
+          </a:p>
+        </p:txBody>
+      </p:sp>
+      <p:sp>
+        <p:nvSpPr>
+          <p:cNvPr id="3" name="标题 2"/>
+          <p:cNvSpPr>
+            <a:spLocks noGrp="1"/>
+          </p:cNvSpPr>
+          <p:nvPr>
+            <p:ph type="title"/>
+          </p:nvPr>
+        </p:nvSpPr>
+        <p:spPr/>
+        <p:txBody>
+          <a:bodyPr/>
+          <a:lstStyle/>
+          <a:p>
+            <a:r>
+              <a:rPr lang="en-US" altLang="zh-CN" dirty="0"/>
+              <a:t>Set up for </a:t>
+            </a:r>
+            <a:r>
+              <a:rPr lang="en-US" altLang="zh-CN" dirty="0" err="1"/>
+              <a:t>LaTeX</a:t>
+            </a:r>
+            <a:endParaRPr lang="zh-CN" altLang="en-US" dirty="0"/>
+          </a:p>
+        </p:txBody>
+      </p:sp>
+      <p:pic>
+        <p:nvPicPr>
+          <p:cNvPr id="5" name="图片 4"/>
+          <p:cNvPicPr>
+            <a:picLocks noChangeAspect="1"/>
+          </p:cNvPicPr>
+          <p:nvPr/>
+        </p:nvPicPr>
+        <p:blipFill>
+          <a:blip r:embed="rId3"/>
+          <a:stretch>
+            <a:fillRect/>
+          </a:stretch>
+        </p:blipFill>
+        <p:spPr>
+          <a:xfrm>
+            <a:off x="2195512" y="1982961"/>
+            <a:ext cx="4752975" cy="3429000"/>
+          </a:xfrm>
+          <a:prstGeom prst="rect">
+            <a:avLst/>
+          </a:prstGeom>
+        </p:spPr>
+      </p:pic>
+    </p:spTree>
+    <p:extLst>
+      <p:ext uri="{BB962C8B-B14F-4D97-AF65-F5344CB8AC3E}">
+        <p14:creationId xmlns:p14="http://schemas.microsoft.com/office/powerpoint/2010/main" val="891786177"/>
+      </p:ext>
+    </p:extLst>
+  </p:cSld>
+  <p:clrMapOvr>
+    <a:masterClrMapping/>
+  </p:clrMapOvr>
+</p:sld>
+</file>
+
+<file path=ppt/slides/slide50.xml><?xml version="1.0" encoding="utf-8"?>
 <p:sld xmlns:a="http://schemas.openxmlformats.org/drawingml/2006/main" xmlns:r="http://schemas.openxmlformats.org/officeDocument/2006/relationships" xmlns:p="http://schemas.openxmlformats.org/presentationml/2006/main">
   <p:cSld>
     <p:spTree>
@@ -12407,7 +15446,7 @@
 </p:sld>
 </file>
 
-<file path=ppt/slides/slide36.xml><?xml version="1.0" encoding="utf-8"?>
+<file path=ppt/slides/slide51.xml><?xml version="1.0" encoding="utf-8"?>
 <p:sld xmlns:a="http://schemas.openxmlformats.org/drawingml/2006/main" xmlns:r="http://schemas.openxmlformats.org/officeDocument/2006/relationships" xmlns:p="http://schemas.openxmlformats.org/presentationml/2006/main">
   <p:cSld>
     <p:spTree>
@@ -12712,330 +15751,6 @@
     <p:extLst>
       <p:ext uri="{BB962C8B-B14F-4D97-AF65-F5344CB8AC3E}">
         <p14:creationId xmlns:p14="http://schemas.microsoft.com/office/powerpoint/2010/main" val="3033535644"/>
-      </p:ext>
-    </p:extLst>
-  </p:cSld>
-  <p:clrMapOvr>
-    <a:masterClrMapping/>
-  </p:clrMapOvr>
-</p:sld>
-</file>
-
-<file path=ppt/slides/slide4.xml><?xml version="1.0" encoding="utf-8"?>
-<p:sld xmlns:a="http://schemas.openxmlformats.org/drawingml/2006/main" xmlns:r="http://schemas.openxmlformats.org/officeDocument/2006/relationships" xmlns:p="http://schemas.openxmlformats.org/presentationml/2006/main">
-  <p:cSld>
-    <p:spTree>
-      <p:nvGrpSpPr>
-        <p:cNvPr id="1" name=""/>
-        <p:cNvGrpSpPr/>
-        <p:nvPr/>
-      </p:nvGrpSpPr>
-      <p:grpSpPr>
-        <a:xfrm>
-          <a:off x="0" y="0"/>
-          <a:ext cx="0" cy="0"/>
-          <a:chOff x="0" y="0"/>
-          <a:chExt cx="0" cy="0"/>
-        </a:xfrm>
-      </p:grpSpPr>
-      <p:sp>
-        <p:nvSpPr>
-          <p:cNvPr id="2" name="内容占位符 1"/>
-          <p:cNvSpPr>
-            <a:spLocks noGrp="1"/>
-          </p:cNvSpPr>
-          <p:nvPr>
-            <p:ph sz="half" idx="2"/>
-          </p:nvPr>
-        </p:nvSpPr>
-        <p:spPr/>
-        <p:txBody>
-          <a:bodyPr/>
-          <a:lstStyle/>
-          <a:p>
-            <a:pPr marL="342900" indent="-342900">
-              <a:buFont typeface="Wingdings" panose="05000000000000000000" pitchFamily="2" charset="2"/>
-              <a:buChar char="l"/>
-            </a:pPr>
-            <a:r>
-              <a:rPr lang="en-US" altLang="zh-CN" dirty="0" smtClean="0"/>
-              <a:t>CTEX is the best solution for using both English and Chinese.</a:t>
-            </a:r>
-          </a:p>
-          <a:p>
-            <a:pPr marL="342900" indent="-342900">
-              <a:buFont typeface="Wingdings" panose="05000000000000000000" pitchFamily="2" charset="2"/>
-              <a:buChar char="l"/>
-            </a:pPr>
-            <a:r>
-              <a:rPr lang="en-US" altLang="zh-CN" dirty="0">
-                <a:hlinkClick r:id="rId2"/>
-              </a:rPr>
-              <a:t>http://</a:t>
-            </a:r>
-            <a:r>
-              <a:rPr lang="en-US" altLang="zh-CN" dirty="0" smtClean="0">
-                <a:hlinkClick r:id="rId2"/>
-              </a:rPr>
-              <a:t>www.ctex.org/HomePage</a:t>
-            </a:r>
-            <a:endParaRPr lang="en-US" altLang="zh-CN" dirty="0" smtClean="0"/>
-          </a:p>
-          <a:p>
-            <a:pPr marL="342900" indent="-342900">
-              <a:buFont typeface="Wingdings" panose="05000000000000000000" pitchFamily="2" charset="2"/>
-              <a:buChar char="l"/>
-            </a:pPr>
-            <a:endParaRPr lang="en-US" altLang="zh-CN" dirty="0"/>
-          </a:p>
-          <a:p>
-            <a:pPr marL="342900" indent="-342900">
-              <a:buFont typeface="Wingdings" panose="05000000000000000000" pitchFamily="2" charset="2"/>
-              <a:buChar char="l"/>
-            </a:pPr>
-            <a:r>
-              <a:rPr lang="en-US" altLang="zh-CN" dirty="0" smtClean="0"/>
-              <a:t>Before installation, you should backup your system PATH environment variable</a:t>
-            </a:r>
-          </a:p>
-          <a:p>
-            <a:pPr marL="342900" indent="-342900">
-              <a:buFont typeface="Wingdings" panose="05000000000000000000" pitchFamily="2" charset="2"/>
-              <a:buChar char="l"/>
-            </a:pPr>
-            <a:endParaRPr lang="en-US" altLang="zh-CN" dirty="0"/>
-          </a:p>
-          <a:p>
-            <a:pPr marL="342900" indent="-342900">
-              <a:buFont typeface="Wingdings" panose="05000000000000000000" pitchFamily="2" charset="2"/>
-              <a:buChar char="l"/>
-            </a:pPr>
-            <a:r>
-              <a:rPr lang="zh-CN" altLang="en-US" dirty="0" smtClean="0"/>
-              <a:t>右键</a:t>
-            </a:r>
-            <a:r>
-              <a:rPr lang="en-US" altLang="zh-CN" dirty="0" smtClean="0"/>
-              <a:t>“</a:t>
-            </a:r>
-            <a:r>
-              <a:rPr lang="zh-CN" altLang="en-US" dirty="0" smtClean="0"/>
-              <a:t>我的电脑</a:t>
-            </a:r>
-            <a:r>
-              <a:rPr lang="en-US" altLang="zh-CN" dirty="0" smtClean="0"/>
-              <a:t>”-&gt;</a:t>
-            </a:r>
-            <a:r>
-              <a:rPr lang="zh-CN" altLang="en-US" dirty="0" smtClean="0"/>
-              <a:t>点击</a:t>
-            </a:r>
-            <a:r>
-              <a:rPr lang="en-US" altLang="zh-CN" dirty="0" smtClean="0"/>
-              <a:t>“</a:t>
-            </a:r>
-            <a:r>
-              <a:rPr lang="zh-CN" altLang="en-US" dirty="0"/>
-              <a:t>属性</a:t>
-            </a:r>
-            <a:r>
-              <a:rPr lang="en-US" altLang="zh-CN" dirty="0" smtClean="0"/>
-              <a:t>”-&gt;</a:t>
-            </a:r>
-            <a:r>
-              <a:rPr lang="zh-CN" altLang="en-US" dirty="0" smtClean="0"/>
-              <a:t>点击</a:t>
-            </a:r>
-            <a:r>
-              <a:rPr lang="en-US" altLang="zh-CN" dirty="0" smtClean="0"/>
-              <a:t>“</a:t>
-            </a:r>
-            <a:r>
-              <a:rPr lang="zh-CN" altLang="en-US" dirty="0" smtClean="0"/>
-              <a:t>高级系统设置</a:t>
-            </a:r>
-            <a:r>
-              <a:rPr lang="en-US" altLang="zh-CN" dirty="0" smtClean="0"/>
-              <a:t>”-&gt;</a:t>
-            </a:r>
-            <a:r>
-              <a:rPr lang="zh-CN" altLang="en-US" dirty="0" smtClean="0"/>
-              <a:t>点击</a:t>
-            </a:r>
-            <a:r>
-              <a:rPr lang="en-US" altLang="zh-CN" dirty="0" smtClean="0"/>
-              <a:t>“</a:t>
-            </a:r>
-            <a:r>
-              <a:rPr lang="zh-CN" altLang="en-US" dirty="0" smtClean="0"/>
-              <a:t>环境变量</a:t>
-            </a:r>
-            <a:r>
-              <a:rPr lang="en-US" altLang="zh-CN" dirty="0" smtClean="0"/>
-              <a:t>”-&gt;</a:t>
-            </a:r>
-            <a:r>
-              <a:rPr lang="zh-CN" altLang="en-US" dirty="0" smtClean="0"/>
-              <a:t>在系统变量中找到</a:t>
-            </a:r>
-            <a:r>
-              <a:rPr lang="en-US" altLang="zh-CN" dirty="0" smtClean="0"/>
-              <a:t>“PATH”-&gt;</a:t>
-            </a:r>
-            <a:r>
-              <a:rPr lang="zh-CN" altLang="en-US" dirty="0" smtClean="0"/>
-              <a:t>全选后复制粘贴到一个新建文本中。</a:t>
-            </a:r>
-            <a:endParaRPr lang="en-US" altLang="zh-CN" dirty="0" smtClean="0"/>
-          </a:p>
-          <a:p>
-            <a:pPr marL="342900" indent="-342900">
-              <a:buFont typeface="Wingdings" panose="05000000000000000000" pitchFamily="2" charset="2"/>
-              <a:buChar char="l"/>
-            </a:pPr>
-            <a:endParaRPr lang="zh-CN" altLang="en-US" dirty="0"/>
-          </a:p>
-        </p:txBody>
-      </p:sp>
-      <p:sp>
-        <p:nvSpPr>
-          <p:cNvPr id="3" name="标题 2"/>
-          <p:cNvSpPr>
-            <a:spLocks noGrp="1"/>
-          </p:cNvSpPr>
-          <p:nvPr>
-            <p:ph type="title"/>
-          </p:nvPr>
-        </p:nvSpPr>
-        <p:spPr/>
-        <p:txBody>
-          <a:bodyPr/>
-          <a:lstStyle/>
-          <a:p>
-            <a:r>
-              <a:rPr lang="en-US" altLang="zh-CN" dirty="0"/>
-              <a:t>Set up for </a:t>
-            </a:r>
-            <a:r>
-              <a:rPr lang="en-US" altLang="zh-CN" dirty="0" err="1"/>
-              <a:t>LaTeX</a:t>
-            </a:r>
-            <a:endParaRPr lang="zh-CN" altLang="en-US" dirty="0"/>
-          </a:p>
-        </p:txBody>
-      </p:sp>
-    </p:spTree>
-    <p:extLst>
-      <p:ext uri="{BB962C8B-B14F-4D97-AF65-F5344CB8AC3E}">
-        <p14:creationId xmlns:p14="http://schemas.microsoft.com/office/powerpoint/2010/main" val="3494694920"/>
-      </p:ext>
-    </p:extLst>
-  </p:cSld>
-  <p:clrMapOvr>
-    <a:masterClrMapping/>
-  </p:clrMapOvr>
-</p:sld>
-</file>
-
-<file path=ppt/slides/slide5.xml><?xml version="1.0" encoding="utf-8"?>
-<p:sld xmlns:a="http://schemas.openxmlformats.org/drawingml/2006/main" xmlns:r="http://schemas.openxmlformats.org/officeDocument/2006/relationships" xmlns:p="http://schemas.openxmlformats.org/presentationml/2006/main">
-  <p:cSld>
-    <p:spTree>
-      <p:nvGrpSpPr>
-        <p:cNvPr id="1" name=""/>
-        <p:cNvGrpSpPr/>
-        <p:nvPr/>
-      </p:nvGrpSpPr>
-      <p:grpSpPr>
-        <a:xfrm>
-          <a:off x="0" y="0"/>
-          <a:ext cx="0" cy="0"/>
-          <a:chOff x="0" y="0"/>
-          <a:chExt cx="0" cy="0"/>
-        </a:xfrm>
-      </p:grpSpPr>
-      <p:sp>
-        <p:nvSpPr>
-          <p:cNvPr id="2" name="内容占位符 1"/>
-          <p:cNvSpPr>
-            <a:spLocks noGrp="1"/>
-          </p:cNvSpPr>
-          <p:nvPr>
-            <p:ph sz="half" idx="2"/>
-          </p:nvPr>
-        </p:nvSpPr>
-        <p:spPr/>
-        <p:txBody>
-          <a:bodyPr/>
-          <a:lstStyle/>
-          <a:p>
-            <a:pPr marL="342900" indent="-342900">
-              <a:buFont typeface="Wingdings" panose="05000000000000000000" pitchFamily="2" charset="2"/>
-              <a:buChar char="l"/>
-            </a:pPr>
-            <a:r>
-              <a:rPr lang="en-US" altLang="zh-CN" dirty="0" smtClean="0"/>
-              <a:t>Installation</a:t>
-            </a:r>
-            <a:endParaRPr lang="zh-CN" altLang="en-US" dirty="0"/>
-          </a:p>
-        </p:txBody>
-      </p:sp>
-      <p:sp>
-        <p:nvSpPr>
-          <p:cNvPr id="3" name="标题 2"/>
-          <p:cNvSpPr>
-            <a:spLocks noGrp="1"/>
-          </p:cNvSpPr>
-          <p:nvPr>
-            <p:ph type="title"/>
-          </p:nvPr>
-        </p:nvSpPr>
-        <p:spPr/>
-        <p:txBody>
-          <a:bodyPr/>
-          <a:lstStyle/>
-          <a:p>
-            <a:r>
-              <a:rPr lang="en-US" altLang="zh-CN" dirty="0"/>
-              <a:t>Set up for </a:t>
-            </a:r>
-            <a:r>
-              <a:rPr lang="en-US" altLang="zh-CN" dirty="0" err="1"/>
-              <a:t>LaTeX</a:t>
-            </a:r>
-            <a:endParaRPr lang="zh-CN" altLang="en-US" dirty="0"/>
-          </a:p>
-        </p:txBody>
-      </p:sp>
-      <p:pic>
-        <p:nvPicPr>
-          <p:cNvPr id="5" name="图片 4"/>
-          <p:cNvPicPr>
-            <a:picLocks noChangeAspect="1"/>
-          </p:cNvPicPr>
-          <p:nvPr/>
-        </p:nvPicPr>
-        <p:blipFill>
-          <a:blip r:embed="rId3"/>
-          <a:stretch>
-            <a:fillRect/>
-          </a:stretch>
-        </p:blipFill>
-        <p:spPr>
-          <a:xfrm>
-            <a:off x="2195512" y="1982961"/>
-            <a:ext cx="4752975" cy="3429000"/>
-          </a:xfrm>
-          <a:prstGeom prst="rect">
-            <a:avLst/>
-          </a:prstGeom>
-        </p:spPr>
-      </p:pic>
-    </p:spTree>
-    <p:extLst>
-      <p:ext uri="{BB962C8B-B14F-4D97-AF65-F5344CB8AC3E}">
-        <p14:creationId xmlns:p14="http://schemas.microsoft.com/office/powerpoint/2010/main" val="891786177"/>
       </p:ext>
     </p:extLst>
   </p:cSld>

</xml_diff>